<commit_message>
Corrections made to diagram
</commit_message>
<xml_diff>
--- a/Report resources/FSMs.pptx
+++ b/Report resources/FSMs.pptx
@@ -242,7 +242,7 @@
             <a:fld id="{97928808-AD4B-4233-A9C4-D341BB4DD817}" type="datetimeFigureOut">
               <a:rPr lang="en-NZ" smtClean="0"/>
               <a:pPr/>
-              <a:t>11/05/2018</a:t>
+              <a:t>23/05/2018</a:t>
             </a:fld>
             <a:endParaRPr lang="en-NZ"/>
           </a:p>
@@ -414,7 +414,7 @@
             <a:fld id="{97928808-AD4B-4233-A9C4-D341BB4DD817}" type="datetimeFigureOut">
               <a:rPr lang="en-NZ" smtClean="0"/>
               <a:pPr/>
-              <a:t>11/05/2018</a:t>
+              <a:t>23/05/2018</a:t>
             </a:fld>
             <a:endParaRPr lang="en-NZ"/>
           </a:p>
@@ -596,7 +596,7 @@
             <a:fld id="{97928808-AD4B-4233-A9C4-D341BB4DD817}" type="datetimeFigureOut">
               <a:rPr lang="en-NZ" smtClean="0"/>
               <a:pPr/>
-              <a:t>11/05/2018</a:t>
+              <a:t>23/05/2018</a:t>
             </a:fld>
             <a:endParaRPr lang="en-NZ"/>
           </a:p>
@@ -768,7 +768,7 @@
             <a:fld id="{97928808-AD4B-4233-A9C4-D341BB4DD817}" type="datetimeFigureOut">
               <a:rPr lang="en-NZ" smtClean="0"/>
               <a:pPr/>
-              <a:t>11/05/2018</a:t>
+              <a:t>23/05/2018</a:t>
             </a:fld>
             <a:endParaRPr lang="en-NZ"/>
           </a:p>
@@ -1016,7 +1016,7 @@
             <a:fld id="{97928808-AD4B-4233-A9C4-D341BB4DD817}" type="datetimeFigureOut">
               <a:rPr lang="en-NZ" smtClean="0"/>
               <a:pPr/>
-              <a:t>11/05/2018</a:t>
+              <a:t>23/05/2018</a:t>
             </a:fld>
             <a:endParaRPr lang="en-NZ"/>
           </a:p>
@@ -1250,7 +1250,7 @@
             <a:fld id="{97928808-AD4B-4233-A9C4-D341BB4DD817}" type="datetimeFigureOut">
               <a:rPr lang="en-NZ" smtClean="0"/>
               <a:pPr/>
-              <a:t>11/05/2018</a:t>
+              <a:t>23/05/2018</a:t>
             </a:fld>
             <a:endParaRPr lang="en-NZ"/>
           </a:p>
@@ -1619,7 +1619,7 @@
             <a:fld id="{97928808-AD4B-4233-A9C4-D341BB4DD817}" type="datetimeFigureOut">
               <a:rPr lang="en-NZ" smtClean="0"/>
               <a:pPr/>
-              <a:t>11/05/2018</a:t>
+              <a:t>23/05/2018</a:t>
             </a:fld>
             <a:endParaRPr lang="en-NZ"/>
           </a:p>
@@ -1739,7 +1739,7 @@
             <a:fld id="{97928808-AD4B-4233-A9C4-D341BB4DD817}" type="datetimeFigureOut">
               <a:rPr lang="en-NZ" smtClean="0"/>
               <a:pPr/>
-              <a:t>11/05/2018</a:t>
+              <a:t>23/05/2018</a:t>
             </a:fld>
             <a:endParaRPr lang="en-NZ"/>
           </a:p>
@@ -1836,7 +1836,7 @@
             <a:fld id="{97928808-AD4B-4233-A9C4-D341BB4DD817}" type="datetimeFigureOut">
               <a:rPr lang="en-NZ" smtClean="0"/>
               <a:pPr/>
-              <a:t>11/05/2018</a:t>
+              <a:t>23/05/2018</a:t>
             </a:fld>
             <a:endParaRPr lang="en-NZ"/>
           </a:p>
@@ -2115,7 +2115,7 @@
             <a:fld id="{97928808-AD4B-4233-A9C4-D341BB4DD817}" type="datetimeFigureOut">
               <a:rPr lang="en-NZ" smtClean="0"/>
               <a:pPr/>
-              <a:t>11/05/2018</a:t>
+              <a:t>23/05/2018</a:t>
             </a:fld>
             <a:endParaRPr lang="en-NZ"/>
           </a:p>
@@ -2370,7 +2370,7 @@
             <a:fld id="{97928808-AD4B-4233-A9C4-D341BB4DD817}" type="datetimeFigureOut">
               <a:rPr lang="en-NZ" smtClean="0"/>
               <a:pPr/>
-              <a:t>11/05/2018</a:t>
+              <a:t>23/05/2018</a:t>
             </a:fld>
             <a:endParaRPr lang="en-NZ"/>
           </a:p>
@@ -2585,7 +2585,7 @@
             <a:fld id="{97928808-AD4B-4233-A9C4-D341BB4DD817}" type="datetimeFigureOut">
               <a:rPr lang="en-NZ" smtClean="0"/>
               <a:pPr/>
-              <a:t>11/05/2018</a:t>
+              <a:t>23/05/2018</a:t>
             </a:fld>
             <a:endParaRPr lang="en-NZ"/>
           </a:p>
@@ -6326,10 +6326,10 @@
         </p:nvGrpSpPr>
         <p:grpSpPr>
           <a:xfrm>
-            <a:off x="1341315" y="452190"/>
-            <a:ext cx="9958754" cy="6041876"/>
-            <a:chOff x="1341315" y="452190"/>
-            <a:chExt cx="9958754" cy="6041876"/>
+            <a:off x="1417767" y="529559"/>
+            <a:ext cx="10323383" cy="5939107"/>
+            <a:chOff x="1417767" y="529559"/>
+            <a:chExt cx="10323383" cy="5939107"/>
           </a:xfrm>
         </p:grpSpPr>
         <p:sp>
@@ -7009,7 +7009,7 @@
           </p:nvSpPr>
           <p:spPr>
             <a:xfrm>
-              <a:off x="2503573" y="2636574"/>
+              <a:off x="2528973" y="3125524"/>
               <a:ext cx="492443" cy="369332"/>
             </a:xfrm>
             <a:prstGeom prst="rect">
@@ -7039,7 +7039,7 @@
           </p:nvSpPr>
           <p:spPr>
             <a:xfrm>
-              <a:off x="5622377" y="2636574"/>
+              <a:off x="5622377" y="3112824"/>
               <a:ext cx="551754" cy="369332"/>
             </a:xfrm>
             <a:prstGeom prst="rect">
@@ -7069,7 +7069,7 @@
           </p:nvSpPr>
           <p:spPr>
             <a:xfrm>
-              <a:off x="8354749" y="825667"/>
+              <a:off x="8335699" y="1181267"/>
               <a:ext cx="976934" cy="369332"/>
             </a:xfrm>
             <a:prstGeom prst="rect">
@@ -7099,7 +7099,7 @@
           </p:nvSpPr>
           <p:spPr>
             <a:xfrm>
-              <a:off x="8278686" y="4647749"/>
+              <a:off x="8278686" y="5016049"/>
               <a:ext cx="1066895" cy="369332"/>
             </a:xfrm>
             <a:prstGeom prst="rect">
@@ -7123,14 +7123,14 @@
         </p:sp>
         <p:sp>
           <p:nvSpPr>
-            <p:cNvPr id="25" name="TextBox 24"/>
+            <p:cNvPr id="29" name="TextBox 28"/>
             <p:cNvSpPr txBox="1"/>
             <p:nvPr/>
           </p:nvSpPr>
           <p:spPr>
             <a:xfrm>
-              <a:off x="5301200" y="2971235"/>
-              <a:ext cx="1398150" cy="646331"/>
+              <a:off x="3562350" y="4215802"/>
+              <a:ext cx="1693726" cy="276999"/>
             </a:xfrm>
             <a:prstGeom prst="rect">
               <a:avLst/>
@@ -7144,113 +7144,23 @@
             <a:lstStyle/>
             <a:p>
               <a:r>
-                <a:rPr lang="en-NZ" dirty="0" smtClean="0"/>
-                <a:t>CruiseState = “00”</a:t>
+                <a:rPr lang="en-NZ" sz="1200" dirty="0" smtClean="0"/>
+                <a:t>On / CruiseState = “01”</a:t>
               </a:r>
-              <a:endParaRPr lang="en-NZ" dirty="0"/>
+              <a:endParaRPr lang="en-NZ" sz="1200" dirty="0"/>
             </a:p>
           </p:txBody>
         </p:sp>
         <p:sp>
           <p:nvSpPr>
-            <p:cNvPr id="26" name="TextBox 25"/>
+            <p:cNvPr id="30" name="TextBox 29"/>
             <p:cNvSpPr txBox="1"/>
             <p:nvPr/>
           </p:nvSpPr>
           <p:spPr>
             <a:xfrm>
-              <a:off x="2193873" y="2971235"/>
-              <a:ext cx="1398150" cy="646331"/>
-            </a:xfrm>
-            <a:prstGeom prst="rect">
-              <a:avLst/>
-            </a:prstGeom>
-            <a:noFill/>
-          </p:spPr>
-          <p:txBody>
-            <a:bodyPr wrap="square" rtlCol="0">
-              <a:spAutoFit/>
-            </a:bodyPr>
-            <a:lstStyle/>
-            <a:p>
-              <a:r>
-                <a:rPr lang="en-NZ" dirty="0" smtClean="0"/>
-                <a:t>CruiseState = “01”</a:t>
-              </a:r>
-              <a:endParaRPr lang="en-NZ" dirty="0"/>
-            </a:p>
-          </p:txBody>
-        </p:sp>
-        <p:sp>
-          <p:nvSpPr>
-            <p:cNvPr id="27" name="TextBox 26"/>
-            <p:cNvSpPr txBox="1"/>
-            <p:nvPr/>
-          </p:nvSpPr>
-          <p:spPr>
-            <a:xfrm>
-              <a:off x="8215060" y="5001737"/>
-              <a:ext cx="1398150" cy="646331"/>
-            </a:xfrm>
-            <a:prstGeom prst="rect">
-              <a:avLst/>
-            </a:prstGeom>
-            <a:noFill/>
-          </p:spPr>
-          <p:txBody>
-            <a:bodyPr wrap="square" rtlCol="0">
-              <a:spAutoFit/>
-            </a:bodyPr>
-            <a:lstStyle/>
-            <a:p>
-              <a:r>
-                <a:rPr lang="en-NZ" dirty="0" smtClean="0"/>
-                <a:t>CruiseState = “10”</a:t>
-              </a:r>
-              <a:endParaRPr lang="en-NZ" dirty="0"/>
-            </a:p>
-          </p:txBody>
-        </p:sp>
-        <p:sp>
-          <p:nvSpPr>
-            <p:cNvPr id="28" name="TextBox 27"/>
-            <p:cNvSpPr txBox="1"/>
-            <p:nvPr/>
-          </p:nvSpPr>
-          <p:spPr>
-            <a:xfrm>
-              <a:off x="8215060" y="1152607"/>
-              <a:ext cx="1398150" cy="646331"/>
-            </a:xfrm>
-            <a:prstGeom prst="rect">
-              <a:avLst/>
-            </a:prstGeom>
-            <a:noFill/>
-          </p:spPr>
-          <p:txBody>
-            <a:bodyPr wrap="square" rtlCol="0">
-              <a:spAutoFit/>
-            </a:bodyPr>
-            <a:lstStyle/>
-            <a:p>
-              <a:r>
-                <a:rPr lang="en-NZ" dirty="0" smtClean="0"/>
-                <a:t>CruiseState = “11”</a:t>
-              </a:r>
-              <a:endParaRPr lang="en-NZ" dirty="0"/>
-            </a:p>
-          </p:txBody>
-        </p:sp>
-        <p:sp>
-          <p:nvSpPr>
-            <p:cNvPr id="29" name="TextBox 28"/>
-            <p:cNvSpPr txBox="1"/>
-            <p:nvPr/>
-          </p:nvSpPr>
-          <p:spPr>
-            <a:xfrm>
-              <a:off x="4012918" y="4215802"/>
-              <a:ext cx="699230" cy="276999"/>
+              <a:off x="3589393" y="2055358"/>
+              <a:ext cx="1648208" cy="276999"/>
             </a:xfrm>
             <a:prstGeom prst="rect">
               <a:avLst/>
@@ -7265,22 +7175,54 @@
             <a:p>
               <a:r>
                 <a:rPr lang="en-NZ" sz="1200" dirty="0" smtClean="0"/>
-                <a:t>On / ON</a:t>
+                <a:t>Off / CruiseState = “00”</a:t>
               </a:r>
-              <a:endParaRPr lang="en-NZ" sz="1200" dirty="0"/>
             </a:p>
           </p:txBody>
         </p:sp>
         <p:sp>
           <p:nvSpPr>
-            <p:cNvPr id="30" name="TextBox 29"/>
+            <p:cNvPr id="31" name="TextBox 30"/>
             <p:cNvSpPr txBox="1"/>
             <p:nvPr/>
           </p:nvSpPr>
           <p:spPr>
             <a:xfrm>
-              <a:off x="4008493" y="2055358"/>
-              <a:ext cx="752257" cy="276999"/>
+              <a:off x="4775201" y="6007001"/>
+              <a:ext cx="2520950" cy="461665"/>
+            </a:xfrm>
+            <a:prstGeom prst="rect">
+              <a:avLst/>
+            </a:prstGeom>
+            <a:noFill/>
+          </p:spPr>
+          <p:txBody>
+            <a:bodyPr wrap="square" rtlCol="0">
+              <a:spAutoFit/>
+            </a:bodyPr>
+            <a:lstStyle/>
+            <a:p>
+              <a:r>
+                <a:rPr lang="en-NZ" sz="1200" dirty="0" smtClean="0"/>
+                <a:t>¬Brake ∧ </a:t>
+              </a:r>
+              <a:r>
+                <a:rPr lang="en-NZ" sz="1200" dirty="0" smtClean="0"/>
+                <a:t>Speed &lt; SpeedMax ∧ Speed &gt; SpeedMin / CruiseState = “01”</a:t>
+              </a:r>
+            </a:p>
+          </p:txBody>
+        </p:sp>
+        <p:sp>
+          <p:nvSpPr>
+            <p:cNvPr id="32" name="TextBox 31"/>
+            <p:cNvSpPr txBox="1"/>
+            <p:nvPr/>
+          </p:nvSpPr>
+          <p:spPr>
+            <a:xfrm rot="16200000">
+              <a:off x="8259364" y="3155161"/>
+              <a:ext cx="1803507" cy="276999"/>
             </a:xfrm>
             <a:prstGeom prst="rect">
               <a:avLst/>
@@ -7295,7 +7237,7 @@
             <a:p>
               <a:r>
                 <a:rPr lang="en-NZ" sz="1200" dirty="0" smtClean="0"/>
-                <a:t>Off / OFF</a:t>
+                <a:t>Brake / CruiseState = “10”</a:t>
               </a:r>
               <a:endParaRPr lang="en-NZ" sz="1200" dirty="0"/>
             </a:p>
@@ -7303,14 +7245,14 @@
         </p:sp>
         <p:sp>
           <p:nvSpPr>
-            <p:cNvPr id="31" name="TextBox 30"/>
+            <p:cNvPr id="33" name="TextBox 32"/>
             <p:cNvSpPr txBox="1"/>
             <p:nvPr/>
           </p:nvSpPr>
           <p:spPr>
             <a:xfrm>
-              <a:off x="5093049" y="6032401"/>
-              <a:ext cx="1993551" cy="461665"/>
+              <a:off x="4711700" y="749602"/>
+              <a:ext cx="2400299" cy="461665"/>
             </a:xfrm>
             <a:prstGeom prst="rect">
               <a:avLst/>
@@ -7325,21 +7267,51 @@
             <a:p>
               <a:r>
                 <a:rPr lang="en-NZ" sz="1200" dirty="0" smtClean="0"/>
-                <a:t>¬Accel ∧ Speed &lt; SpeedMax ∧ Speed &gt; SpeedMin / ON</a:t>
+                <a:t>Accel ∨ Speed &gt; SpeedMax ∨ Speed &lt; SpeedMin / CruiseState = “11”</a:t>
+              </a:r>
+              <a:endParaRPr lang="en-NZ" sz="1200" dirty="0"/>
+            </a:p>
+          </p:txBody>
+        </p:sp>
+        <p:sp>
+          <p:nvSpPr>
+            <p:cNvPr id="34" name="TextBox 33"/>
+            <p:cNvSpPr txBox="1"/>
+            <p:nvPr/>
+          </p:nvSpPr>
+          <p:spPr>
+            <a:xfrm rot="19702667">
+              <a:off x="1855531" y="682789"/>
+              <a:ext cx="2505599" cy="461665"/>
+            </a:xfrm>
+            <a:prstGeom prst="rect">
+              <a:avLst/>
+            </a:prstGeom>
+            <a:noFill/>
+          </p:spPr>
+          <p:txBody>
+            <a:bodyPr wrap="square" rtlCol="0">
+              <a:spAutoFit/>
+            </a:bodyPr>
+            <a:lstStyle/>
+            <a:p>
+              <a:r>
+                <a:rPr lang="en-NZ" sz="1200" dirty="0" smtClean="0"/>
+                <a:t>¬Accel ∧ Speed &lt; SpeedMax ∧ Speed &gt; SpeedMin / CruiseState = “01”</a:t>
               </a:r>
             </a:p>
           </p:txBody>
         </p:sp>
         <p:sp>
           <p:nvSpPr>
-            <p:cNvPr id="32" name="TextBox 31"/>
+            <p:cNvPr id="35" name="TextBox 34"/>
             <p:cNvSpPr txBox="1"/>
             <p:nvPr/>
           </p:nvSpPr>
           <p:spPr>
-            <a:xfrm rot="16200000">
-              <a:off x="8632255" y="3155161"/>
-              <a:ext cx="1057725" cy="276999"/>
+            <a:xfrm rot="19302333">
+              <a:off x="6314362" y="1858428"/>
+              <a:ext cx="1648208" cy="276999"/>
             </a:xfrm>
             <a:prstGeom prst="rect">
               <a:avLst/>
@@ -7354,26 +7326,50 @@
             <a:p>
               <a:r>
                 <a:rPr lang="en-NZ" sz="1200" dirty="0" smtClean="0"/>
-                <a:t>Brake / </a:t>
+                <a:t>Off / CruiseState = “00”</a:t>
               </a:r>
-              <a:r>
-                <a:rPr lang="en-NZ" sz="1200" dirty="0" smtClean="0"/>
-                <a:t>STDBY</a:t>
-              </a:r>
-              <a:endParaRPr lang="en-NZ" sz="1200" dirty="0"/>
             </a:p>
           </p:txBody>
         </p:sp>
         <p:sp>
           <p:nvSpPr>
-            <p:cNvPr id="33" name="TextBox 32"/>
+            <p:cNvPr id="36" name="TextBox 35"/>
             <p:cNvSpPr txBox="1"/>
             <p:nvPr/>
           </p:nvSpPr>
           <p:spPr>
-            <a:xfrm>
-              <a:off x="4900833" y="749602"/>
-              <a:ext cx="2049242" cy="461665"/>
+            <a:xfrm rot="2436033">
+              <a:off x="6270048" y="4469216"/>
+              <a:ext cx="1648208" cy="276999"/>
+            </a:xfrm>
+            <a:prstGeom prst="rect">
+              <a:avLst/>
+            </a:prstGeom>
+            <a:noFill/>
+          </p:spPr>
+          <p:txBody>
+            <a:bodyPr wrap="none" rtlCol="0">
+              <a:spAutoFit/>
+            </a:bodyPr>
+            <a:lstStyle/>
+            <a:p>
+              <a:r>
+                <a:rPr lang="en-NZ" sz="1200" dirty="0" smtClean="0"/>
+                <a:t>Off / CruiseState = “00”</a:t>
+              </a:r>
+            </a:p>
+          </p:txBody>
+        </p:sp>
+        <p:sp>
+          <p:nvSpPr>
+            <p:cNvPr id="37" name="TextBox 36"/>
+            <p:cNvSpPr txBox="1"/>
+            <p:nvPr/>
+          </p:nvSpPr>
+          <p:spPr>
+            <a:xfrm rot="16200000">
+              <a:off x="271152" y="3191320"/>
+              <a:ext cx="2754896" cy="461665"/>
             </a:xfrm>
             <a:prstGeom prst="rect">
               <a:avLst/>
@@ -7388,38 +7384,51 @@
             <a:p>
               <a:r>
                 <a:rPr lang="en-NZ" sz="1200" dirty="0" smtClean="0"/>
-                <a:t>Accel ∨ </a:t>
+                <a:t>¬Accel ∧ Speed &lt; SpeedMax ∧ Speed &gt; SpeedMin / CruiseState = “01”</a:t>
               </a:r>
-              <a:r>
-                <a:rPr lang="en-NZ" sz="1200" dirty="0" smtClean="0"/>
-                <a:t>Speed </a:t>
-              </a:r>
-              <a:r>
-                <a:rPr lang="en-NZ" sz="1200" dirty="0" smtClean="0"/>
-                <a:t>&gt; </a:t>
-              </a:r>
-              <a:r>
-                <a:rPr lang="en-NZ" sz="1200" dirty="0" smtClean="0"/>
-                <a:t>SpeedMax </a:t>
-              </a:r>
-              <a:r>
-                <a:rPr lang="en-NZ" sz="1200" dirty="0" smtClean="0"/>
-                <a:t>∨ Speed &lt; SpeedMin / DISABLE</a:t>
-              </a:r>
-              <a:endParaRPr lang="en-NZ" sz="1200" dirty="0" smtClean="0"/>
             </a:p>
           </p:txBody>
         </p:sp>
         <p:sp>
           <p:nvSpPr>
-            <p:cNvPr id="34" name="TextBox 33"/>
+            <p:cNvPr id="38" name="TextBox 37"/>
             <p:cNvSpPr txBox="1"/>
             <p:nvPr/>
           </p:nvSpPr>
           <p:spPr>
-            <a:xfrm rot="19702667">
-              <a:off x="2267018" y="452190"/>
-              <a:ext cx="1965085" cy="461665"/>
+            <a:xfrm>
+              <a:off x="9256368" y="5754647"/>
+              <a:ext cx="1803507" cy="276999"/>
+            </a:xfrm>
+            <a:prstGeom prst="rect">
+              <a:avLst/>
+            </a:prstGeom>
+            <a:noFill/>
+          </p:spPr>
+          <p:txBody>
+            <a:bodyPr wrap="none" rtlCol="0">
+              <a:spAutoFit/>
+            </a:bodyPr>
+            <a:lstStyle/>
+            <a:p>
+              <a:r>
+                <a:rPr lang="en-NZ" sz="1200" dirty="0" smtClean="0"/>
+                <a:t>Brake / CruiseState = “10”</a:t>
+              </a:r>
+              <a:endParaRPr lang="en-NZ" sz="1200" dirty="0"/>
+            </a:p>
+          </p:txBody>
+        </p:sp>
+        <p:sp>
+          <p:nvSpPr>
+            <p:cNvPr id="39" name="TextBox 38"/>
+            <p:cNvSpPr txBox="1"/>
+            <p:nvPr/>
+          </p:nvSpPr>
+          <p:spPr>
+            <a:xfrm rot="16200000">
+              <a:off x="8758095" y="2998142"/>
+              <a:ext cx="2546350" cy="461665"/>
             </a:xfrm>
             <a:prstGeom prst="rect">
               <a:avLst/>
@@ -7434,177 +7443,15 @@
             <a:p>
               <a:r>
                 <a:rPr lang="en-NZ" sz="1200" dirty="0" smtClean="0"/>
-                <a:t>¬Accel ∧ Speed &lt; SpeedMax ∧ Speed </a:t>
+                <a:t>¬Brake ∧</a:t>
               </a:r>
               <a:r>
                 <a:rPr lang="en-NZ" sz="1200" dirty="0" smtClean="0"/>
-                <a:t>&gt; </a:t>
+                <a:t> </a:t>
               </a:r>
               <a:r>
                 <a:rPr lang="en-NZ" sz="1200" dirty="0" smtClean="0"/>
-                <a:t>SpeedMin / ON</a:t>
-              </a:r>
-              <a:endParaRPr lang="en-NZ" sz="1200" dirty="0" smtClean="0"/>
-            </a:p>
-          </p:txBody>
-        </p:sp>
-        <p:sp>
-          <p:nvSpPr>
-            <p:cNvPr id="35" name="TextBox 34"/>
-            <p:cNvSpPr txBox="1"/>
-            <p:nvPr/>
-          </p:nvSpPr>
-          <p:spPr>
-            <a:xfrm rot="19380422">
-              <a:off x="6762338" y="1858428"/>
-              <a:ext cx="752257" cy="276999"/>
-            </a:xfrm>
-            <a:prstGeom prst="rect">
-              <a:avLst/>
-            </a:prstGeom>
-            <a:noFill/>
-          </p:spPr>
-          <p:txBody>
-            <a:bodyPr wrap="none" rtlCol="0">
-              <a:spAutoFit/>
-            </a:bodyPr>
-            <a:lstStyle/>
-            <a:p>
-              <a:r>
-                <a:rPr lang="en-NZ" sz="1200" dirty="0" smtClean="0"/>
-                <a:t>Off / OFF</a:t>
-              </a:r>
-              <a:endParaRPr lang="en-NZ" sz="1200" dirty="0"/>
-            </a:p>
-          </p:txBody>
-        </p:sp>
-        <p:sp>
-          <p:nvSpPr>
-            <p:cNvPr id="36" name="TextBox 35"/>
-            <p:cNvSpPr txBox="1"/>
-            <p:nvPr/>
-          </p:nvSpPr>
-          <p:spPr>
-            <a:xfrm rot="2398101">
-              <a:off x="6718024" y="4469216"/>
-              <a:ext cx="752257" cy="276999"/>
-            </a:xfrm>
-            <a:prstGeom prst="rect">
-              <a:avLst/>
-            </a:prstGeom>
-            <a:noFill/>
-          </p:spPr>
-          <p:txBody>
-            <a:bodyPr wrap="none" rtlCol="0">
-              <a:spAutoFit/>
-            </a:bodyPr>
-            <a:lstStyle/>
-            <a:p>
-              <a:r>
-                <a:rPr lang="en-NZ" sz="1200" dirty="0" smtClean="0"/>
-                <a:t>Off / OFF</a:t>
-              </a:r>
-              <a:endParaRPr lang="en-NZ" sz="1200" dirty="0"/>
-            </a:p>
-          </p:txBody>
-        </p:sp>
-        <p:sp>
-          <p:nvSpPr>
-            <p:cNvPr id="37" name="TextBox 36"/>
-            <p:cNvSpPr txBox="1"/>
-            <p:nvPr/>
-          </p:nvSpPr>
-          <p:spPr>
-            <a:xfrm rot="16200000">
-              <a:off x="581025" y="3323641"/>
-              <a:ext cx="1982245" cy="461665"/>
-            </a:xfrm>
-            <a:prstGeom prst="rect">
-              <a:avLst/>
-            </a:prstGeom>
-            <a:noFill/>
-          </p:spPr>
-          <p:txBody>
-            <a:bodyPr wrap="square" rtlCol="0">
-              <a:spAutoFit/>
-            </a:bodyPr>
-            <a:lstStyle/>
-            <a:p>
-              <a:r>
-                <a:rPr lang="en-NZ" sz="1200" dirty="0" smtClean="0"/>
-                <a:t>¬Accel ∧ Speed &lt; SpeedMax </a:t>
-              </a:r>
-              <a:r>
-                <a:rPr lang="en-NZ" sz="1200" dirty="0" smtClean="0"/>
-                <a:t>∧ Speed </a:t>
-              </a:r>
-              <a:r>
-                <a:rPr lang="en-NZ" sz="1200" dirty="0" smtClean="0"/>
-                <a:t>&gt; SpeedMin / </a:t>
-              </a:r>
-              <a:r>
-                <a:rPr lang="en-NZ" sz="1200" dirty="0" smtClean="0"/>
-                <a:t>ON</a:t>
-              </a:r>
-              <a:endParaRPr lang="en-NZ" sz="1200" dirty="0" smtClean="0"/>
-            </a:p>
-          </p:txBody>
-        </p:sp>
-        <p:sp>
-          <p:nvSpPr>
-            <p:cNvPr id="38" name="TextBox 37"/>
-            <p:cNvSpPr txBox="1"/>
-            <p:nvPr/>
-          </p:nvSpPr>
-          <p:spPr>
-            <a:xfrm>
-              <a:off x="9256368" y="5754647"/>
-              <a:ext cx="1057725" cy="276999"/>
-            </a:xfrm>
-            <a:prstGeom prst="rect">
-              <a:avLst/>
-            </a:prstGeom>
-            <a:noFill/>
-          </p:spPr>
-          <p:txBody>
-            <a:bodyPr wrap="none" rtlCol="0">
-              <a:spAutoFit/>
-            </a:bodyPr>
-            <a:lstStyle/>
-            <a:p>
-              <a:r>
-                <a:rPr lang="en-NZ" sz="1200" dirty="0" smtClean="0"/>
-                <a:t>Brake / STDBY</a:t>
-              </a:r>
-              <a:endParaRPr lang="en-NZ" sz="1200" dirty="0"/>
-            </a:p>
-          </p:txBody>
-        </p:sp>
-        <p:sp>
-          <p:nvSpPr>
-            <p:cNvPr id="39" name="TextBox 38"/>
-            <p:cNvSpPr txBox="1"/>
-            <p:nvPr/>
-          </p:nvSpPr>
-          <p:spPr>
-            <a:xfrm rot="16200000">
-              <a:off x="8959559" y="2975580"/>
-              <a:ext cx="2092618" cy="461665"/>
-            </a:xfrm>
-            <a:prstGeom prst="rect">
-              <a:avLst/>
-            </a:prstGeom>
-            <a:noFill/>
-          </p:spPr>
-          <p:txBody>
-            <a:bodyPr wrap="square" rtlCol="0">
-              <a:spAutoFit/>
-            </a:bodyPr>
-            <a:lstStyle/>
-            <a:p>
-              <a:r>
-                <a:rPr lang="en-NZ" sz="1200" dirty="0" smtClean="0"/>
-                <a:t>Accel ∨ Speed &gt; SpeedMax ∨ Speed &lt; SpeedMin / DISABLE</a:t>
+                <a:t>Speed &gt; SpeedMax ∨ Speed &lt; SpeedMin / CruiseState = “11”</a:t>
               </a:r>
             </a:p>
           </p:txBody>
@@ -7633,9 +7480,8 @@
             <a:p>
               <a:r>
                 <a:rPr lang="en-NZ" sz="1200" dirty="0" smtClean="0"/>
-                <a:t>Off ∨ Resume ∨ Set ∨ QuickAccel ∨ QuickDecel / OFF</a:t>
+                <a:t>Off ∨ Resume ∨ Set ∨ QuickAccel ∨ QuickDecel / CruiseState = “00”</a:t>
               </a:r>
-              <a:endParaRPr lang="en-NZ" sz="1200" dirty="0"/>
             </a:p>
           </p:txBody>
         </p:sp>
@@ -7730,7 +7576,7 @@
           <p:spPr>
             <a:xfrm>
               <a:off x="5050427" y="5149213"/>
-              <a:ext cx="1057725" cy="276999"/>
+              <a:ext cx="1803507" cy="276999"/>
             </a:xfrm>
             <a:prstGeom prst="rect">
               <a:avLst/>
@@ -7745,7 +7591,7 @@
             <a:p>
               <a:r>
                 <a:rPr lang="en-NZ" sz="1200" dirty="0" smtClean="0"/>
-                <a:t>Brake / STDBY</a:t>
+                <a:t>Brake / CruiseState = “10”</a:t>
               </a:r>
               <a:endParaRPr lang="en-NZ" sz="1200" dirty="0"/>
             </a:p>
@@ -7759,8 +7605,8 @@
           </p:nvSpPr>
           <p:spPr>
             <a:xfrm>
-              <a:off x="9294781" y="529559"/>
-              <a:ext cx="2005288" cy="461665"/>
+              <a:off x="9294780" y="529559"/>
+              <a:ext cx="2446370" cy="461665"/>
             </a:xfrm>
             <a:prstGeom prst="rect">
               <a:avLst/>
@@ -7774,7 +7620,7 @@
             <a:p>
               <a:r>
                 <a:rPr lang="en-NZ" sz="1200" dirty="0" smtClean="0"/>
-                <a:t>Accel ∨ Speed &gt; SpeedMax ∨ Speed &lt; SpeedMin / DISABLE</a:t>
+                <a:t>Accel ∨ Speed &gt; SpeedMax ∨ Speed &lt; SpeedMin / CruiseState = “11”</a:t>
               </a:r>
             </a:p>
           </p:txBody>
@@ -7786,9 +7632,9 @@
             <p:nvPr/>
           </p:nvSpPr>
           <p:spPr>
-            <a:xfrm rot="4212243">
-              <a:off x="5656318" y="1969633"/>
-              <a:ext cx="596638" cy="276999"/>
+            <a:xfrm rot="4310510">
+              <a:off x="5144843" y="1861683"/>
+              <a:ext cx="1492588" cy="276999"/>
             </a:xfrm>
             <a:prstGeom prst="rect">
               <a:avLst/>
@@ -7803,9 +7649,8 @@
             <a:p>
               <a:r>
                 <a:rPr lang="en-NZ" sz="1200" dirty="0" smtClean="0"/>
-                <a:t>. / OFF</a:t>
+                <a:t>. / CruiseState = “00”</a:t>
               </a:r>
-              <a:endParaRPr lang="en-NZ" sz="1200" dirty="0"/>
             </a:p>
           </p:txBody>
         </p:sp>

</xml_diff>

<commit_message>
Worked on cruise speed management implementation as part of the cruise control system
</commit_message>
<xml_diff>
--- a/Report resources/FSMs.pptx
+++ b/Report resources/FSMs.pptx
@@ -9,6 +9,7 @@
     <p:sldId id="256" r:id="rId3"/>
     <p:sldId id="257" r:id="rId4"/>
     <p:sldId id="259" r:id="rId5"/>
+    <p:sldId id="261" r:id="rId6"/>
   </p:sldIdLst>
   <p:sldSz cx="12192000" cy="6858000"/>
   <p:notesSz cx="6858000" cy="9144000"/>
@@ -294,7 +295,7 @@
     </p:spTree>
     <p:extLst>
       <p:ext uri="{BB962C8B-B14F-4D97-AF65-F5344CB8AC3E}">
-        <p14:creationId xmlns="" xmlns:p14="http://schemas.microsoft.com/office/powerpoint/2010/main" val="3619705574"/>
+        <p14:creationId xmlns:p14="http://schemas.microsoft.com/office/powerpoint/2010/main" xmlns="" val="3619705574"/>
       </p:ext>
     </p:extLst>
   </p:cSld>
@@ -466,7 +467,7 @@
     </p:spTree>
     <p:extLst>
       <p:ext uri="{BB962C8B-B14F-4D97-AF65-F5344CB8AC3E}">
-        <p14:creationId xmlns="" xmlns:p14="http://schemas.microsoft.com/office/powerpoint/2010/main" val="4081113674"/>
+        <p14:creationId xmlns:p14="http://schemas.microsoft.com/office/powerpoint/2010/main" xmlns="" val="4081113674"/>
       </p:ext>
     </p:extLst>
   </p:cSld>
@@ -648,7 +649,7 @@
     </p:spTree>
     <p:extLst>
       <p:ext uri="{BB962C8B-B14F-4D97-AF65-F5344CB8AC3E}">
-        <p14:creationId xmlns="" xmlns:p14="http://schemas.microsoft.com/office/powerpoint/2010/main" val="363994899"/>
+        <p14:creationId xmlns:p14="http://schemas.microsoft.com/office/powerpoint/2010/main" xmlns="" val="363994899"/>
       </p:ext>
     </p:extLst>
   </p:cSld>
@@ -820,7 +821,7 @@
     </p:spTree>
     <p:extLst>
       <p:ext uri="{BB962C8B-B14F-4D97-AF65-F5344CB8AC3E}">
-        <p14:creationId xmlns="" xmlns:p14="http://schemas.microsoft.com/office/powerpoint/2010/main" val="1654254160"/>
+        <p14:creationId xmlns:p14="http://schemas.microsoft.com/office/powerpoint/2010/main" xmlns="" val="1654254160"/>
       </p:ext>
     </p:extLst>
   </p:cSld>
@@ -1068,7 +1069,7 @@
     </p:spTree>
     <p:extLst>
       <p:ext uri="{BB962C8B-B14F-4D97-AF65-F5344CB8AC3E}">
-        <p14:creationId xmlns="" xmlns:p14="http://schemas.microsoft.com/office/powerpoint/2010/main" val="1837508371"/>
+        <p14:creationId xmlns:p14="http://schemas.microsoft.com/office/powerpoint/2010/main" xmlns="" val="1837508371"/>
       </p:ext>
     </p:extLst>
   </p:cSld>
@@ -1302,7 +1303,7 @@
     </p:spTree>
     <p:extLst>
       <p:ext uri="{BB962C8B-B14F-4D97-AF65-F5344CB8AC3E}">
-        <p14:creationId xmlns="" xmlns:p14="http://schemas.microsoft.com/office/powerpoint/2010/main" val="74891894"/>
+        <p14:creationId xmlns:p14="http://schemas.microsoft.com/office/powerpoint/2010/main" xmlns="" val="74891894"/>
       </p:ext>
     </p:extLst>
   </p:cSld>
@@ -1671,7 +1672,7 @@
     </p:spTree>
     <p:extLst>
       <p:ext uri="{BB962C8B-B14F-4D97-AF65-F5344CB8AC3E}">
-        <p14:creationId xmlns="" xmlns:p14="http://schemas.microsoft.com/office/powerpoint/2010/main" val="1001197104"/>
+        <p14:creationId xmlns:p14="http://schemas.microsoft.com/office/powerpoint/2010/main" xmlns="" val="1001197104"/>
       </p:ext>
     </p:extLst>
   </p:cSld>
@@ -1791,7 +1792,7 @@
     </p:spTree>
     <p:extLst>
       <p:ext uri="{BB962C8B-B14F-4D97-AF65-F5344CB8AC3E}">
-        <p14:creationId xmlns="" xmlns:p14="http://schemas.microsoft.com/office/powerpoint/2010/main" val="4204311132"/>
+        <p14:creationId xmlns:p14="http://schemas.microsoft.com/office/powerpoint/2010/main" xmlns="" val="4204311132"/>
       </p:ext>
     </p:extLst>
   </p:cSld>
@@ -1888,7 +1889,7 @@
     </p:spTree>
     <p:extLst>
       <p:ext uri="{BB962C8B-B14F-4D97-AF65-F5344CB8AC3E}">
-        <p14:creationId xmlns="" xmlns:p14="http://schemas.microsoft.com/office/powerpoint/2010/main" val="3392200464"/>
+        <p14:creationId xmlns:p14="http://schemas.microsoft.com/office/powerpoint/2010/main" xmlns="" val="3392200464"/>
       </p:ext>
     </p:extLst>
   </p:cSld>
@@ -2167,7 +2168,7 @@
     </p:spTree>
     <p:extLst>
       <p:ext uri="{BB962C8B-B14F-4D97-AF65-F5344CB8AC3E}">
-        <p14:creationId xmlns="" xmlns:p14="http://schemas.microsoft.com/office/powerpoint/2010/main" val="3347108319"/>
+        <p14:creationId xmlns:p14="http://schemas.microsoft.com/office/powerpoint/2010/main" xmlns="" val="3347108319"/>
       </p:ext>
     </p:extLst>
   </p:cSld>
@@ -2422,7 +2423,7 @@
     </p:spTree>
     <p:extLst>
       <p:ext uri="{BB962C8B-B14F-4D97-AF65-F5344CB8AC3E}">
-        <p14:creationId xmlns="" xmlns:p14="http://schemas.microsoft.com/office/powerpoint/2010/main" val="1123632367"/>
+        <p14:creationId xmlns:p14="http://schemas.microsoft.com/office/powerpoint/2010/main" xmlns="" val="1123632367"/>
       </p:ext>
     </p:extLst>
   </p:cSld>
@@ -2673,7 +2674,7 @@
     </p:spTree>
     <p:extLst>
       <p:ext uri="{BB962C8B-B14F-4D97-AF65-F5344CB8AC3E}">
-        <p14:creationId xmlns="" xmlns:p14="http://schemas.microsoft.com/office/powerpoint/2010/main" val="609734527"/>
+        <p14:creationId xmlns:p14="http://schemas.microsoft.com/office/powerpoint/2010/main" xmlns="" val="609734527"/>
       </p:ext>
     </p:extLst>
   </p:cSld>
@@ -4670,7 +4671,7 @@
     </p:spTree>
     <p:extLst>
       <p:ext uri="{BB962C8B-B14F-4D97-AF65-F5344CB8AC3E}">
-        <p14:creationId xmlns="" xmlns:p14="http://schemas.microsoft.com/office/powerpoint/2010/main" val="843927471"/>
+        <p14:creationId xmlns:p14="http://schemas.microsoft.com/office/powerpoint/2010/main" xmlns="" val="843927471"/>
       </p:ext>
     </p:extLst>
   </p:cSld>
@@ -6291,7 +6292,7 @@
     </p:spTree>
     <p:extLst>
       <p:ext uri="{BB962C8B-B14F-4D97-AF65-F5344CB8AC3E}">
-        <p14:creationId xmlns="" xmlns:p14="http://schemas.microsoft.com/office/powerpoint/2010/main" val="3340299871"/>
+        <p14:creationId xmlns:p14="http://schemas.microsoft.com/office/powerpoint/2010/main" xmlns="" val="3340299871"/>
       </p:ext>
     </p:extLst>
   </p:cSld>
@@ -7204,11 +7205,7 @@
             <a:p>
               <a:r>
                 <a:rPr lang="en-NZ" sz="1200" dirty="0" smtClean="0"/>
-                <a:t>¬Brake ∧ </a:t>
-              </a:r>
-              <a:r>
-                <a:rPr lang="en-NZ" sz="1200" dirty="0" smtClean="0"/>
-                <a:t>Speed &lt; SpeedMax ∧ Speed &gt; SpeedMin / CruiseState = “01”</a:t>
+                <a:t>¬Brake ∧ Speed &lt; SpeedMax ∧ Speed &gt; SpeedMin / CruiseState = “01”</a:t>
               </a:r>
             </a:p>
           </p:txBody>
@@ -7443,15 +7440,7 @@
             <a:p>
               <a:r>
                 <a:rPr lang="en-NZ" sz="1200" dirty="0" smtClean="0"/>
-                <a:t>¬Brake ∧</a:t>
-              </a:r>
-              <a:r>
-                <a:rPr lang="en-NZ" sz="1200" dirty="0" smtClean="0"/>
-                <a:t> </a:t>
-              </a:r>
-              <a:r>
-                <a:rPr lang="en-NZ" sz="1200" dirty="0" smtClean="0"/>
-                <a:t>Speed &gt; SpeedMax ∨ Speed &lt; SpeedMin / CruiseState = “11”</a:t>
+                <a:t>¬Brake ∧ Speed &gt; SpeedMax ∨ Speed &lt; SpeedMin / CruiseState = “11”</a:t>
               </a:r>
             </a:p>
           </p:txBody>
@@ -7697,6 +7686,2006 @@
         </p:cxnSp>
       </p:grpSp>
     </p:spTree>
+  </p:cSld>
+  <p:clrMapOvr>
+    <a:masterClrMapping/>
+  </p:clrMapOvr>
+</p:sld>
+</file>
+
+<file path=ppt/slides/slide5.xml><?xml version="1.0" encoding="utf-8"?>
+<p:sld xmlns:a="http://schemas.openxmlformats.org/drawingml/2006/main" xmlns:r="http://schemas.openxmlformats.org/officeDocument/2006/relationships" xmlns:p="http://schemas.openxmlformats.org/presentationml/2006/main">
+  <p:cSld>
+    <p:spTree>
+      <p:nvGrpSpPr>
+        <p:cNvPr id="1" name=""/>
+        <p:cNvGrpSpPr/>
+        <p:nvPr/>
+      </p:nvGrpSpPr>
+      <p:grpSpPr>
+        <a:xfrm>
+          <a:off x="0" y="0"/>
+          <a:ext cx="0" cy="0"/>
+          <a:chOff x="0" y="0"/>
+          <a:chExt cx="0" cy="0"/>
+        </a:xfrm>
+      </p:grpSpPr>
+      <p:sp>
+        <p:nvSpPr>
+          <p:cNvPr id="20" name="Rounded Rectangle 19"/>
+          <p:cNvSpPr/>
+          <p:nvPr/>
+        </p:nvSpPr>
+        <p:spPr>
+          <a:xfrm>
+            <a:off x="2290271" y="358924"/>
+            <a:ext cx="1897166" cy="888762"/>
+          </a:xfrm>
+          <a:prstGeom prst="roundRect">
+            <a:avLst/>
+          </a:prstGeom>
+          <a:noFill/>
+          <a:ln w="28575">
+            <a:solidFill>
+              <a:schemeClr val="tx1"/>
+            </a:solidFill>
+          </a:ln>
+        </p:spPr>
+        <p:style>
+          <a:lnRef idx="2">
+            <a:schemeClr val="accent1">
+              <a:shade val="50000"/>
+            </a:schemeClr>
+          </a:lnRef>
+          <a:fillRef idx="1">
+            <a:schemeClr val="accent1"/>
+          </a:fillRef>
+          <a:effectRef idx="0">
+            <a:schemeClr val="accent1"/>
+          </a:effectRef>
+          <a:fontRef idx="minor">
+            <a:schemeClr val="lt1"/>
+          </a:fontRef>
+        </p:style>
+        <p:txBody>
+          <a:bodyPr rtlCol="0" anchor="ctr"/>
+          <a:lstStyle/>
+          <a:p>
+            <a:pPr algn="ctr"/>
+            <a:endParaRPr lang="en-NZ"/>
+          </a:p>
+        </p:txBody>
+      </p:sp>
+      <p:sp>
+        <p:nvSpPr>
+          <p:cNvPr id="22" name="Diamond 21"/>
+          <p:cNvSpPr/>
+          <p:nvPr/>
+        </p:nvSpPr>
+        <p:spPr>
+          <a:xfrm>
+            <a:off x="2563736" y="1632247"/>
+            <a:ext cx="1350236" cy="1350236"/>
+          </a:xfrm>
+          <a:prstGeom prst="diamond">
+            <a:avLst/>
+          </a:prstGeom>
+          <a:noFill/>
+          <a:ln w="28575">
+            <a:solidFill>
+              <a:schemeClr val="tx1"/>
+            </a:solidFill>
+          </a:ln>
+        </p:spPr>
+        <p:style>
+          <a:lnRef idx="2">
+            <a:schemeClr val="accent1">
+              <a:shade val="50000"/>
+            </a:schemeClr>
+          </a:lnRef>
+          <a:fillRef idx="1">
+            <a:schemeClr val="accent1"/>
+          </a:fillRef>
+          <a:effectRef idx="0">
+            <a:schemeClr val="accent1"/>
+          </a:effectRef>
+          <a:fontRef idx="minor">
+            <a:schemeClr val="lt1"/>
+          </a:fontRef>
+        </p:style>
+        <p:txBody>
+          <a:bodyPr rtlCol="0" anchor="ctr"/>
+          <a:lstStyle/>
+          <a:p>
+            <a:pPr algn="ctr"/>
+            <a:endParaRPr lang="en-NZ"/>
+          </a:p>
+        </p:txBody>
+      </p:sp>
+      <p:sp>
+        <p:nvSpPr>
+          <p:cNvPr id="23" name="Diamond 22"/>
+          <p:cNvSpPr/>
+          <p:nvPr/>
+        </p:nvSpPr>
+        <p:spPr>
+          <a:xfrm>
+            <a:off x="2563736" y="3367044"/>
+            <a:ext cx="1350236" cy="1350236"/>
+          </a:xfrm>
+          <a:prstGeom prst="diamond">
+            <a:avLst/>
+          </a:prstGeom>
+          <a:noFill/>
+          <a:ln w="28575">
+            <a:solidFill>
+              <a:schemeClr val="tx1"/>
+            </a:solidFill>
+          </a:ln>
+        </p:spPr>
+        <p:style>
+          <a:lnRef idx="2">
+            <a:schemeClr val="accent1">
+              <a:shade val="50000"/>
+            </a:schemeClr>
+          </a:lnRef>
+          <a:fillRef idx="1">
+            <a:schemeClr val="accent1"/>
+          </a:fillRef>
+          <a:effectRef idx="0">
+            <a:schemeClr val="accent1"/>
+          </a:effectRef>
+          <a:fontRef idx="minor">
+            <a:schemeClr val="lt1"/>
+          </a:fontRef>
+        </p:style>
+        <p:txBody>
+          <a:bodyPr rtlCol="0" anchor="ctr"/>
+          <a:lstStyle/>
+          <a:p>
+            <a:pPr algn="ctr"/>
+            <a:endParaRPr lang="en-NZ"/>
+          </a:p>
+        </p:txBody>
+      </p:sp>
+      <p:sp>
+        <p:nvSpPr>
+          <p:cNvPr id="24" name="Diamond 23"/>
+          <p:cNvSpPr/>
+          <p:nvPr/>
+        </p:nvSpPr>
+        <p:spPr>
+          <a:xfrm>
+            <a:off x="2563736" y="5101841"/>
+            <a:ext cx="1350236" cy="1350236"/>
+          </a:xfrm>
+          <a:prstGeom prst="diamond">
+            <a:avLst/>
+          </a:prstGeom>
+          <a:noFill/>
+          <a:ln w="28575">
+            <a:solidFill>
+              <a:schemeClr val="tx1"/>
+            </a:solidFill>
+          </a:ln>
+        </p:spPr>
+        <p:style>
+          <a:lnRef idx="2">
+            <a:schemeClr val="accent1">
+              <a:shade val="50000"/>
+            </a:schemeClr>
+          </a:lnRef>
+          <a:fillRef idx="1">
+            <a:schemeClr val="accent1"/>
+          </a:fillRef>
+          <a:effectRef idx="0">
+            <a:schemeClr val="accent1"/>
+          </a:effectRef>
+          <a:fontRef idx="minor">
+            <a:schemeClr val="lt1"/>
+          </a:fontRef>
+        </p:style>
+        <p:txBody>
+          <a:bodyPr rtlCol="0" anchor="ctr"/>
+          <a:lstStyle/>
+          <a:p>
+            <a:pPr algn="ctr"/>
+            <a:endParaRPr lang="en-NZ"/>
+          </a:p>
+        </p:txBody>
+      </p:sp>
+      <p:cxnSp>
+        <p:nvCxnSpPr>
+          <p:cNvPr id="26" name="Straight Arrow Connector 25"/>
+          <p:cNvCxnSpPr>
+            <a:stCxn id="20" idx="2"/>
+            <a:endCxn id="22" idx="0"/>
+          </p:cNvCxnSpPr>
+          <p:nvPr/>
+        </p:nvCxnSpPr>
+        <p:spPr>
+          <a:xfrm>
+            <a:off x="3238854" y="1247686"/>
+            <a:ext cx="0" cy="384561"/>
+          </a:xfrm>
+          <a:prstGeom prst="straightConnector1">
+            <a:avLst/>
+          </a:prstGeom>
+          <a:ln w="28575">
+            <a:solidFill>
+              <a:schemeClr val="tx1"/>
+            </a:solidFill>
+            <a:tailEnd type="triangle"/>
+          </a:ln>
+        </p:spPr>
+        <p:style>
+          <a:lnRef idx="1">
+            <a:schemeClr val="accent1"/>
+          </a:lnRef>
+          <a:fillRef idx="0">
+            <a:schemeClr val="accent1"/>
+          </a:fillRef>
+          <a:effectRef idx="0">
+            <a:schemeClr val="accent1"/>
+          </a:effectRef>
+          <a:fontRef idx="minor">
+            <a:schemeClr val="tx1"/>
+          </a:fontRef>
+        </p:style>
+      </p:cxnSp>
+      <p:cxnSp>
+        <p:nvCxnSpPr>
+          <p:cNvPr id="27" name="Straight Arrow Connector 26"/>
+          <p:cNvCxnSpPr/>
+          <p:nvPr/>
+        </p:nvCxnSpPr>
+        <p:spPr>
+          <a:xfrm>
+            <a:off x="3238854" y="2982483"/>
+            <a:ext cx="0" cy="384561"/>
+          </a:xfrm>
+          <a:prstGeom prst="straightConnector1">
+            <a:avLst/>
+          </a:prstGeom>
+          <a:ln w="28575">
+            <a:solidFill>
+              <a:schemeClr val="tx1"/>
+            </a:solidFill>
+            <a:tailEnd type="triangle"/>
+          </a:ln>
+        </p:spPr>
+        <p:style>
+          <a:lnRef idx="1">
+            <a:schemeClr val="accent1"/>
+          </a:lnRef>
+          <a:fillRef idx="0">
+            <a:schemeClr val="accent1"/>
+          </a:fillRef>
+          <a:effectRef idx="0">
+            <a:schemeClr val="accent1"/>
+          </a:effectRef>
+          <a:fontRef idx="minor">
+            <a:schemeClr val="tx1"/>
+          </a:fontRef>
+        </p:style>
+      </p:cxnSp>
+      <p:cxnSp>
+        <p:nvCxnSpPr>
+          <p:cNvPr id="28" name="Straight Arrow Connector 27"/>
+          <p:cNvCxnSpPr/>
+          <p:nvPr/>
+        </p:nvCxnSpPr>
+        <p:spPr>
+          <a:xfrm>
+            <a:off x="3238854" y="4717280"/>
+            <a:ext cx="0" cy="384561"/>
+          </a:xfrm>
+          <a:prstGeom prst="straightConnector1">
+            <a:avLst/>
+          </a:prstGeom>
+          <a:ln w="28575">
+            <a:solidFill>
+              <a:schemeClr val="tx1"/>
+            </a:solidFill>
+            <a:tailEnd type="triangle"/>
+          </a:ln>
+        </p:spPr>
+        <p:style>
+          <a:lnRef idx="1">
+            <a:schemeClr val="accent1"/>
+          </a:lnRef>
+          <a:fillRef idx="0">
+            <a:schemeClr val="accent1"/>
+          </a:fillRef>
+          <a:effectRef idx="0">
+            <a:schemeClr val="accent1"/>
+          </a:effectRef>
+          <a:fontRef idx="minor">
+            <a:schemeClr val="tx1"/>
+          </a:fontRef>
+        </p:style>
+      </p:cxnSp>
+      <p:sp>
+        <p:nvSpPr>
+          <p:cNvPr id="29" name="Rectangle 28"/>
+          <p:cNvSpPr/>
+          <p:nvPr/>
+        </p:nvSpPr>
+        <p:spPr>
+          <a:xfrm>
+            <a:off x="4495087" y="1837346"/>
+            <a:ext cx="1529697" cy="940038"/>
+          </a:xfrm>
+          <a:prstGeom prst="rect">
+            <a:avLst/>
+          </a:prstGeom>
+          <a:noFill/>
+          <a:ln w="28575">
+            <a:solidFill>
+              <a:schemeClr val="tx1"/>
+            </a:solidFill>
+          </a:ln>
+        </p:spPr>
+        <p:style>
+          <a:lnRef idx="2">
+            <a:schemeClr val="accent1">
+              <a:shade val="50000"/>
+            </a:schemeClr>
+          </a:lnRef>
+          <a:fillRef idx="1">
+            <a:schemeClr val="accent1"/>
+          </a:fillRef>
+          <a:effectRef idx="0">
+            <a:schemeClr val="accent1"/>
+          </a:effectRef>
+          <a:fontRef idx="minor">
+            <a:schemeClr val="lt1"/>
+          </a:fontRef>
+        </p:style>
+        <p:txBody>
+          <a:bodyPr rtlCol="0" anchor="ctr"/>
+          <a:lstStyle/>
+          <a:p>
+            <a:pPr algn="ctr"/>
+            <a:endParaRPr lang="en-NZ"/>
+          </a:p>
+        </p:txBody>
+      </p:sp>
+      <p:sp>
+        <p:nvSpPr>
+          <p:cNvPr id="30" name="Rectangle 29"/>
+          <p:cNvSpPr/>
+          <p:nvPr/>
+        </p:nvSpPr>
+        <p:spPr>
+          <a:xfrm>
+            <a:off x="4495086" y="3572143"/>
+            <a:ext cx="1529697" cy="940038"/>
+          </a:xfrm>
+          <a:prstGeom prst="rect">
+            <a:avLst/>
+          </a:prstGeom>
+          <a:noFill/>
+          <a:ln w="28575">
+            <a:solidFill>
+              <a:schemeClr val="tx1"/>
+            </a:solidFill>
+          </a:ln>
+        </p:spPr>
+        <p:style>
+          <a:lnRef idx="2">
+            <a:schemeClr val="accent1">
+              <a:shade val="50000"/>
+            </a:schemeClr>
+          </a:lnRef>
+          <a:fillRef idx="1">
+            <a:schemeClr val="accent1"/>
+          </a:fillRef>
+          <a:effectRef idx="0">
+            <a:schemeClr val="accent1"/>
+          </a:effectRef>
+          <a:fontRef idx="minor">
+            <a:schemeClr val="lt1"/>
+          </a:fontRef>
+        </p:style>
+        <p:txBody>
+          <a:bodyPr rtlCol="0" anchor="ctr"/>
+          <a:lstStyle/>
+          <a:p>
+            <a:pPr algn="ctr"/>
+            <a:endParaRPr lang="en-NZ"/>
+          </a:p>
+        </p:txBody>
+      </p:sp>
+      <p:sp>
+        <p:nvSpPr>
+          <p:cNvPr id="31" name="Rectangle 30"/>
+          <p:cNvSpPr/>
+          <p:nvPr/>
+        </p:nvSpPr>
+        <p:spPr>
+          <a:xfrm>
+            <a:off x="4495086" y="5306940"/>
+            <a:ext cx="1529697" cy="940038"/>
+          </a:xfrm>
+          <a:prstGeom prst="rect">
+            <a:avLst/>
+          </a:prstGeom>
+          <a:noFill/>
+          <a:ln w="28575">
+            <a:solidFill>
+              <a:schemeClr val="tx1"/>
+            </a:solidFill>
+          </a:ln>
+        </p:spPr>
+        <p:style>
+          <a:lnRef idx="2">
+            <a:schemeClr val="accent1">
+              <a:shade val="50000"/>
+            </a:schemeClr>
+          </a:lnRef>
+          <a:fillRef idx="1">
+            <a:schemeClr val="accent1"/>
+          </a:fillRef>
+          <a:effectRef idx="0">
+            <a:schemeClr val="accent1"/>
+          </a:effectRef>
+          <a:fontRef idx="minor">
+            <a:schemeClr val="lt1"/>
+          </a:fontRef>
+        </p:style>
+        <p:txBody>
+          <a:bodyPr rtlCol="0" anchor="ctr"/>
+          <a:lstStyle/>
+          <a:p>
+            <a:pPr algn="ctr"/>
+            <a:endParaRPr lang="en-NZ"/>
+          </a:p>
+        </p:txBody>
+      </p:sp>
+      <p:cxnSp>
+        <p:nvCxnSpPr>
+          <p:cNvPr id="34" name="Straight Arrow Connector 33"/>
+          <p:cNvCxnSpPr>
+            <a:stCxn id="22" idx="3"/>
+            <a:endCxn id="29" idx="1"/>
+          </p:cNvCxnSpPr>
+          <p:nvPr/>
+        </p:nvCxnSpPr>
+        <p:spPr>
+          <a:xfrm>
+            <a:off x="3913972" y="2307365"/>
+            <a:ext cx="581115" cy="0"/>
+          </a:xfrm>
+          <a:prstGeom prst="straightConnector1">
+            <a:avLst/>
+          </a:prstGeom>
+          <a:ln w="28575">
+            <a:solidFill>
+              <a:schemeClr val="tx1"/>
+            </a:solidFill>
+            <a:tailEnd type="triangle"/>
+          </a:ln>
+        </p:spPr>
+        <p:style>
+          <a:lnRef idx="1">
+            <a:schemeClr val="accent1"/>
+          </a:lnRef>
+          <a:fillRef idx="0">
+            <a:schemeClr val="accent1"/>
+          </a:fillRef>
+          <a:effectRef idx="0">
+            <a:schemeClr val="accent1"/>
+          </a:effectRef>
+          <a:fontRef idx="minor">
+            <a:schemeClr val="tx1"/>
+          </a:fontRef>
+        </p:style>
+      </p:cxnSp>
+      <p:cxnSp>
+        <p:nvCxnSpPr>
+          <p:cNvPr id="35" name="Straight Arrow Connector 34"/>
+          <p:cNvCxnSpPr/>
+          <p:nvPr/>
+        </p:nvCxnSpPr>
+        <p:spPr>
+          <a:xfrm>
+            <a:off x="3913971" y="4042162"/>
+            <a:ext cx="581115" cy="0"/>
+          </a:xfrm>
+          <a:prstGeom prst="straightConnector1">
+            <a:avLst/>
+          </a:prstGeom>
+          <a:ln w="28575">
+            <a:solidFill>
+              <a:schemeClr val="tx1"/>
+            </a:solidFill>
+            <a:tailEnd type="triangle"/>
+          </a:ln>
+        </p:spPr>
+        <p:style>
+          <a:lnRef idx="1">
+            <a:schemeClr val="accent1"/>
+          </a:lnRef>
+          <a:fillRef idx="0">
+            <a:schemeClr val="accent1"/>
+          </a:fillRef>
+          <a:effectRef idx="0">
+            <a:schemeClr val="accent1"/>
+          </a:effectRef>
+          <a:fontRef idx="minor">
+            <a:schemeClr val="tx1"/>
+          </a:fontRef>
+        </p:style>
+      </p:cxnSp>
+      <p:cxnSp>
+        <p:nvCxnSpPr>
+          <p:cNvPr id="36" name="Straight Arrow Connector 35"/>
+          <p:cNvCxnSpPr/>
+          <p:nvPr/>
+        </p:nvCxnSpPr>
+        <p:spPr>
+          <a:xfrm>
+            <a:off x="3913971" y="5776959"/>
+            <a:ext cx="581115" cy="0"/>
+          </a:xfrm>
+          <a:prstGeom prst="straightConnector1">
+            <a:avLst/>
+          </a:prstGeom>
+          <a:ln w="28575">
+            <a:solidFill>
+              <a:schemeClr val="tx1"/>
+            </a:solidFill>
+            <a:tailEnd type="triangle"/>
+          </a:ln>
+        </p:spPr>
+        <p:style>
+          <a:lnRef idx="1">
+            <a:schemeClr val="accent1"/>
+          </a:lnRef>
+          <a:fillRef idx="0">
+            <a:schemeClr val="accent1"/>
+          </a:fillRef>
+          <a:effectRef idx="0">
+            <a:schemeClr val="accent1"/>
+          </a:effectRef>
+          <a:fontRef idx="minor">
+            <a:schemeClr val="tx1"/>
+          </a:fontRef>
+        </p:style>
+      </p:cxnSp>
+      <p:sp>
+        <p:nvSpPr>
+          <p:cNvPr id="40" name="TextBox 39"/>
+          <p:cNvSpPr txBox="1"/>
+          <p:nvPr/>
+        </p:nvSpPr>
+        <p:spPr>
+          <a:xfrm>
+            <a:off x="2863302" y="612319"/>
+            <a:ext cx="751103" cy="369332"/>
+          </a:xfrm>
+          <a:prstGeom prst="rect">
+            <a:avLst/>
+          </a:prstGeom>
+          <a:noFill/>
+        </p:spPr>
+        <p:txBody>
+          <a:bodyPr wrap="none" rtlCol="0">
+            <a:spAutoFit/>
+          </a:bodyPr>
+          <a:lstStyle/>
+          <a:p>
+            <a:pPr algn="ctr"/>
+            <a:r>
+              <a:rPr lang="en-NZ" dirty="0" smtClean="0"/>
+              <a:t>START</a:t>
+            </a:r>
+            <a:endParaRPr lang="en-NZ" dirty="0"/>
+          </a:p>
+        </p:txBody>
+      </p:sp>
+      <p:sp>
+        <p:nvSpPr>
+          <p:cNvPr id="41" name="TextBox 40"/>
+          <p:cNvSpPr txBox="1"/>
+          <p:nvPr/>
+        </p:nvSpPr>
+        <p:spPr>
+          <a:xfrm>
+            <a:off x="2676840" y="2122699"/>
+            <a:ext cx="1124026" cy="369332"/>
+          </a:xfrm>
+          <a:prstGeom prst="rect">
+            <a:avLst/>
+          </a:prstGeom>
+          <a:noFill/>
+        </p:spPr>
+        <p:txBody>
+          <a:bodyPr wrap="none" rtlCol="0">
+            <a:spAutoFit/>
+          </a:bodyPr>
+          <a:lstStyle/>
+          <a:p>
+            <a:pPr algn="ctr"/>
+            <a:r>
+              <a:rPr lang="en-NZ" dirty="0" smtClean="0"/>
+              <a:t>ON or SET</a:t>
+            </a:r>
+            <a:endParaRPr lang="en-NZ" dirty="0"/>
+          </a:p>
+        </p:txBody>
+      </p:sp>
+      <p:sp>
+        <p:nvSpPr>
+          <p:cNvPr id="42" name="TextBox 41"/>
+          <p:cNvSpPr txBox="1"/>
+          <p:nvPr/>
+        </p:nvSpPr>
+        <p:spPr>
+          <a:xfrm>
+            <a:off x="2679972" y="3847526"/>
+            <a:ext cx="1213795" cy="369332"/>
+          </a:xfrm>
+          <a:prstGeom prst="rect">
+            <a:avLst/>
+          </a:prstGeom>
+          <a:noFill/>
+        </p:spPr>
+        <p:txBody>
+          <a:bodyPr wrap="none" rtlCol="0">
+            <a:spAutoFit/>
+          </a:bodyPr>
+          <a:lstStyle/>
+          <a:p>
+            <a:pPr algn="ctr"/>
+            <a:r>
+              <a:rPr lang="en-NZ" dirty="0" err="1" smtClean="0"/>
+              <a:t>QuickAccel</a:t>
+            </a:r>
+            <a:endParaRPr lang="en-NZ" dirty="0"/>
+          </a:p>
+        </p:txBody>
+      </p:sp>
+      <p:sp>
+        <p:nvSpPr>
+          <p:cNvPr id="43" name="TextBox 42"/>
+          <p:cNvSpPr txBox="1"/>
+          <p:nvPr/>
+        </p:nvSpPr>
+        <p:spPr>
+          <a:xfrm>
+            <a:off x="2666346" y="5602263"/>
+            <a:ext cx="1241045" cy="369332"/>
+          </a:xfrm>
+          <a:prstGeom prst="rect">
+            <a:avLst/>
+          </a:prstGeom>
+          <a:noFill/>
+        </p:spPr>
+        <p:txBody>
+          <a:bodyPr wrap="none" rtlCol="0">
+            <a:spAutoFit/>
+          </a:bodyPr>
+          <a:lstStyle/>
+          <a:p>
+            <a:pPr algn="ctr"/>
+            <a:r>
+              <a:rPr lang="en-NZ" dirty="0" err="1" smtClean="0"/>
+              <a:t>QuickDecel</a:t>
+            </a:r>
+            <a:endParaRPr lang="en-NZ" dirty="0"/>
+          </a:p>
+        </p:txBody>
+      </p:sp>
+      <p:sp>
+        <p:nvSpPr>
+          <p:cNvPr id="44" name="TextBox 43"/>
+          <p:cNvSpPr txBox="1"/>
+          <p:nvPr/>
+        </p:nvSpPr>
+        <p:spPr>
+          <a:xfrm>
+            <a:off x="4053686" y="1959268"/>
+            <a:ext cx="301686" cy="369332"/>
+          </a:xfrm>
+          <a:prstGeom prst="rect">
+            <a:avLst/>
+          </a:prstGeom>
+          <a:noFill/>
+        </p:spPr>
+        <p:txBody>
+          <a:bodyPr wrap="none" rtlCol="0">
+            <a:spAutoFit/>
+          </a:bodyPr>
+          <a:lstStyle/>
+          <a:p>
+            <a:pPr algn="ctr"/>
+            <a:r>
+              <a:rPr lang="en-NZ" dirty="0" smtClean="0"/>
+              <a:t>1</a:t>
+            </a:r>
+            <a:endParaRPr lang="en-NZ" dirty="0"/>
+          </a:p>
+        </p:txBody>
+      </p:sp>
+      <p:sp>
+        <p:nvSpPr>
+          <p:cNvPr id="45" name="TextBox 44"/>
+          <p:cNvSpPr txBox="1"/>
+          <p:nvPr/>
+        </p:nvSpPr>
+        <p:spPr>
+          <a:xfrm>
+            <a:off x="4053686" y="3694064"/>
+            <a:ext cx="301686" cy="369332"/>
+          </a:xfrm>
+          <a:prstGeom prst="rect">
+            <a:avLst/>
+          </a:prstGeom>
+          <a:noFill/>
+        </p:spPr>
+        <p:txBody>
+          <a:bodyPr wrap="none" rtlCol="0">
+            <a:spAutoFit/>
+          </a:bodyPr>
+          <a:lstStyle/>
+          <a:p>
+            <a:pPr algn="ctr"/>
+            <a:r>
+              <a:rPr lang="en-NZ" dirty="0" smtClean="0"/>
+              <a:t>1</a:t>
+            </a:r>
+            <a:endParaRPr lang="en-NZ" dirty="0"/>
+          </a:p>
+        </p:txBody>
+      </p:sp>
+      <p:sp>
+        <p:nvSpPr>
+          <p:cNvPr id="46" name="TextBox 45"/>
+          <p:cNvSpPr txBox="1"/>
+          <p:nvPr/>
+        </p:nvSpPr>
+        <p:spPr>
+          <a:xfrm>
+            <a:off x="4053686" y="5428860"/>
+            <a:ext cx="301686" cy="369332"/>
+          </a:xfrm>
+          <a:prstGeom prst="rect">
+            <a:avLst/>
+          </a:prstGeom>
+          <a:noFill/>
+        </p:spPr>
+        <p:txBody>
+          <a:bodyPr wrap="none" rtlCol="0">
+            <a:spAutoFit/>
+          </a:bodyPr>
+          <a:lstStyle/>
+          <a:p>
+            <a:pPr algn="ctr"/>
+            <a:r>
+              <a:rPr lang="en-NZ" dirty="0" smtClean="0"/>
+              <a:t>1</a:t>
+            </a:r>
+            <a:endParaRPr lang="en-NZ" dirty="0"/>
+          </a:p>
+        </p:txBody>
+      </p:sp>
+      <p:sp>
+        <p:nvSpPr>
+          <p:cNvPr id="48" name="TextBox 47"/>
+          <p:cNvSpPr txBox="1"/>
+          <p:nvPr/>
+        </p:nvSpPr>
+        <p:spPr>
+          <a:xfrm>
+            <a:off x="3238853" y="2972513"/>
+            <a:ext cx="301686" cy="369332"/>
+          </a:xfrm>
+          <a:prstGeom prst="rect">
+            <a:avLst/>
+          </a:prstGeom>
+          <a:noFill/>
+        </p:spPr>
+        <p:txBody>
+          <a:bodyPr wrap="none" rtlCol="0">
+            <a:spAutoFit/>
+          </a:bodyPr>
+          <a:lstStyle/>
+          <a:p>
+            <a:pPr algn="ctr"/>
+            <a:r>
+              <a:rPr lang="en-NZ" dirty="0"/>
+              <a:t>0</a:t>
+            </a:r>
+          </a:p>
+        </p:txBody>
+      </p:sp>
+      <p:sp>
+        <p:nvSpPr>
+          <p:cNvPr id="49" name="TextBox 48"/>
+          <p:cNvSpPr txBox="1"/>
+          <p:nvPr/>
+        </p:nvSpPr>
+        <p:spPr>
+          <a:xfrm>
+            <a:off x="3238853" y="4717280"/>
+            <a:ext cx="301686" cy="369332"/>
+          </a:xfrm>
+          <a:prstGeom prst="rect">
+            <a:avLst/>
+          </a:prstGeom>
+          <a:noFill/>
+        </p:spPr>
+        <p:txBody>
+          <a:bodyPr wrap="none" rtlCol="0">
+            <a:spAutoFit/>
+          </a:bodyPr>
+          <a:lstStyle/>
+          <a:p>
+            <a:pPr algn="ctr"/>
+            <a:r>
+              <a:rPr lang="en-NZ" dirty="0"/>
+              <a:t>0</a:t>
+            </a:r>
+          </a:p>
+        </p:txBody>
+      </p:sp>
+      <p:cxnSp>
+        <p:nvCxnSpPr>
+          <p:cNvPr id="51" name="Elbow Connector 50"/>
+          <p:cNvCxnSpPr>
+            <a:stCxn id="24" idx="2"/>
+          </p:cNvCxnSpPr>
+          <p:nvPr/>
+        </p:nvCxnSpPr>
+        <p:spPr>
+          <a:xfrm rot="5400000" flipH="1">
+            <a:off x="750789" y="3964012"/>
+            <a:ext cx="4950996" cy="25135"/>
+          </a:xfrm>
+          <a:prstGeom prst="bentConnector5">
+            <a:avLst>
+              <a:gd name="adj1" fmla="val -4617"/>
+              <a:gd name="adj2" fmla="val 4921786"/>
+              <a:gd name="adj3" fmla="val 99997"/>
+            </a:avLst>
+          </a:prstGeom>
+          <a:ln w="28575">
+            <a:solidFill>
+              <a:schemeClr val="tx1"/>
+            </a:solidFill>
+            <a:tailEnd type="triangle"/>
+          </a:ln>
+        </p:spPr>
+        <p:style>
+          <a:lnRef idx="1">
+            <a:schemeClr val="accent1"/>
+          </a:lnRef>
+          <a:fillRef idx="0">
+            <a:schemeClr val="accent1"/>
+          </a:fillRef>
+          <a:effectRef idx="0">
+            <a:schemeClr val="accent1"/>
+          </a:effectRef>
+          <a:fontRef idx="minor">
+            <a:schemeClr val="tx1"/>
+          </a:fontRef>
+        </p:style>
+      </p:cxnSp>
+      <p:sp>
+        <p:nvSpPr>
+          <p:cNvPr id="62" name="TextBox 61"/>
+          <p:cNvSpPr txBox="1"/>
+          <p:nvPr/>
+        </p:nvSpPr>
+        <p:spPr>
+          <a:xfrm>
+            <a:off x="3282940" y="6425087"/>
+            <a:ext cx="301686" cy="369332"/>
+          </a:xfrm>
+          <a:prstGeom prst="rect">
+            <a:avLst/>
+          </a:prstGeom>
+          <a:noFill/>
+        </p:spPr>
+        <p:txBody>
+          <a:bodyPr wrap="none" rtlCol="0">
+            <a:spAutoFit/>
+          </a:bodyPr>
+          <a:lstStyle/>
+          <a:p>
+            <a:pPr algn="ctr"/>
+            <a:r>
+              <a:rPr lang="en-NZ" dirty="0"/>
+              <a:t>0</a:t>
+            </a:r>
+          </a:p>
+        </p:txBody>
+      </p:sp>
+      <p:sp>
+        <p:nvSpPr>
+          <p:cNvPr id="63" name="TextBox 62"/>
+          <p:cNvSpPr txBox="1"/>
+          <p:nvPr/>
+        </p:nvSpPr>
+        <p:spPr>
+          <a:xfrm>
+            <a:off x="4227087" y="593804"/>
+            <a:ext cx="2065694" cy="369332"/>
+          </a:xfrm>
+          <a:prstGeom prst="rect">
+            <a:avLst/>
+          </a:prstGeom>
+          <a:noFill/>
+        </p:spPr>
+        <p:txBody>
+          <a:bodyPr wrap="none" rtlCol="0">
+            <a:spAutoFit/>
+          </a:bodyPr>
+          <a:lstStyle/>
+          <a:p>
+            <a:pPr algn="ctr"/>
+            <a:r>
+              <a:rPr lang="en-NZ" dirty="0"/>
+              <a:t>t</a:t>
+            </a:r>
+            <a:r>
+              <a:rPr lang="en-NZ" dirty="0" smtClean="0"/>
+              <a:t>emp = </a:t>
+            </a:r>
+            <a:r>
+              <a:rPr lang="en-NZ" dirty="0" err="1" smtClean="0"/>
+              <a:t>CruiseSpeed</a:t>
+            </a:r>
+            <a:endParaRPr lang="en-NZ" dirty="0"/>
+          </a:p>
+        </p:txBody>
+      </p:sp>
+      <p:sp>
+        <p:nvSpPr>
+          <p:cNvPr id="64" name="TextBox 63"/>
+          <p:cNvSpPr txBox="1"/>
+          <p:nvPr/>
+        </p:nvSpPr>
+        <p:spPr>
+          <a:xfrm>
+            <a:off x="4494853" y="1959268"/>
+            <a:ext cx="1530166" cy="646331"/>
+          </a:xfrm>
+          <a:prstGeom prst="rect">
+            <a:avLst/>
+          </a:prstGeom>
+          <a:noFill/>
+        </p:spPr>
+        <p:txBody>
+          <a:bodyPr wrap="square" rtlCol="0">
+            <a:spAutoFit/>
+          </a:bodyPr>
+          <a:lstStyle/>
+          <a:p>
+            <a:pPr algn="ctr"/>
+            <a:r>
+              <a:rPr lang="en-NZ" dirty="0"/>
+              <a:t>t</a:t>
+            </a:r>
+            <a:r>
+              <a:rPr lang="en-NZ" dirty="0" smtClean="0"/>
+              <a:t>emp = </a:t>
+            </a:r>
+            <a:r>
+              <a:rPr lang="en-NZ" dirty="0" err="1" smtClean="0"/>
+              <a:t>CurrentSpeed</a:t>
+            </a:r>
+            <a:endParaRPr lang="en-NZ" dirty="0"/>
+          </a:p>
+        </p:txBody>
+      </p:sp>
+      <p:sp>
+        <p:nvSpPr>
+          <p:cNvPr id="65" name="TextBox 64"/>
+          <p:cNvSpPr txBox="1"/>
+          <p:nvPr/>
+        </p:nvSpPr>
+        <p:spPr>
+          <a:xfrm>
+            <a:off x="4493662" y="3721263"/>
+            <a:ext cx="1530166" cy="646331"/>
+          </a:xfrm>
+          <a:prstGeom prst="rect">
+            <a:avLst/>
+          </a:prstGeom>
+          <a:noFill/>
+        </p:spPr>
+        <p:txBody>
+          <a:bodyPr wrap="square" rtlCol="0">
+            <a:spAutoFit/>
+          </a:bodyPr>
+          <a:lstStyle/>
+          <a:p>
+            <a:pPr algn="ctr"/>
+            <a:r>
+              <a:rPr lang="en-NZ" dirty="0"/>
+              <a:t>temp += </a:t>
+            </a:r>
+            <a:r>
+              <a:rPr lang="en-NZ" dirty="0" err="1"/>
+              <a:t>SpeedInc</a:t>
+            </a:r>
+            <a:endParaRPr lang="en-NZ" dirty="0"/>
+          </a:p>
+        </p:txBody>
+      </p:sp>
+      <p:sp>
+        <p:nvSpPr>
+          <p:cNvPr id="66" name="TextBox 65"/>
+          <p:cNvSpPr txBox="1"/>
+          <p:nvPr/>
+        </p:nvSpPr>
+        <p:spPr>
+          <a:xfrm>
+            <a:off x="4503230" y="5480780"/>
+            <a:ext cx="1530166" cy="646331"/>
+          </a:xfrm>
+          <a:prstGeom prst="rect">
+            <a:avLst/>
+          </a:prstGeom>
+          <a:noFill/>
+        </p:spPr>
+        <p:txBody>
+          <a:bodyPr wrap="square" rtlCol="0">
+            <a:spAutoFit/>
+          </a:bodyPr>
+          <a:lstStyle/>
+          <a:p>
+            <a:pPr algn="ctr"/>
+            <a:r>
+              <a:rPr lang="en-NZ" dirty="0"/>
+              <a:t>t</a:t>
+            </a:r>
+            <a:r>
+              <a:rPr lang="en-NZ" dirty="0" smtClean="0"/>
+              <a:t>emp -= </a:t>
+            </a:r>
+            <a:r>
+              <a:rPr lang="en-NZ" dirty="0" err="1" smtClean="0"/>
+              <a:t>SpeedInc</a:t>
+            </a:r>
+            <a:endParaRPr lang="en-NZ" dirty="0"/>
+          </a:p>
+        </p:txBody>
+      </p:sp>
+      <p:sp>
+        <p:nvSpPr>
+          <p:cNvPr id="68" name="Diamond 67"/>
+          <p:cNvSpPr/>
+          <p:nvPr/>
+        </p:nvSpPr>
+        <p:spPr>
+          <a:xfrm>
+            <a:off x="6906827" y="2416923"/>
+            <a:ext cx="1350236" cy="1350236"/>
+          </a:xfrm>
+          <a:prstGeom prst="diamond">
+            <a:avLst/>
+          </a:prstGeom>
+          <a:noFill/>
+          <a:ln w="28575">
+            <a:solidFill>
+              <a:schemeClr val="tx1"/>
+            </a:solidFill>
+          </a:ln>
+        </p:spPr>
+        <p:style>
+          <a:lnRef idx="2">
+            <a:schemeClr val="accent1">
+              <a:shade val="50000"/>
+            </a:schemeClr>
+          </a:lnRef>
+          <a:fillRef idx="1">
+            <a:schemeClr val="accent1"/>
+          </a:fillRef>
+          <a:effectRef idx="0">
+            <a:schemeClr val="accent1"/>
+          </a:effectRef>
+          <a:fontRef idx="minor">
+            <a:schemeClr val="lt1"/>
+          </a:fontRef>
+        </p:style>
+        <p:txBody>
+          <a:bodyPr rtlCol="0" anchor="ctr"/>
+          <a:lstStyle/>
+          <a:p>
+            <a:pPr algn="ctr"/>
+            <a:endParaRPr lang="en-NZ"/>
+          </a:p>
+        </p:txBody>
+      </p:sp>
+      <p:sp>
+        <p:nvSpPr>
+          <p:cNvPr id="69" name="Rectangle 68"/>
+          <p:cNvSpPr/>
+          <p:nvPr/>
+        </p:nvSpPr>
+        <p:spPr>
+          <a:xfrm>
+            <a:off x="6973066" y="2720713"/>
+            <a:ext cx="1217757" cy="646331"/>
+          </a:xfrm>
+          <a:prstGeom prst="rect">
+            <a:avLst/>
+          </a:prstGeom>
+        </p:spPr>
+        <p:txBody>
+          <a:bodyPr wrap="square">
+            <a:spAutoFit/>
+          </a:bodyPr>
+          <a:lstStyle/>
+          <a:p>
+            <a:pPr algn="ctr"/>
+            <a:r>
+              <a:rPr lang="en-NZ" dirty="0"/>
+              <a:t>temp </a:t>
+            </a:r>
+            <a:r>
+              <a:rPr lang="en-NZ" dirty="0" smtClean="0"/>
+              <a:t>&gt; </a:t>
+            </a:r>
+            <a:r>
+              <a:rPr lang="en-NZ" dirty="0" err="1" smtClean="0"/>
+              <a:t>SpeedMax</a:t>
+            </a:r>
+            <a:endParaRPr lang="en-NZ" dirty="0"/>
+          </a:p>
+        </p:txBody>
+      </p:sp>
+      <p:sp>
+        <p:nvSpPr>
+          <p:cNvPr id="70" name="Diamond 69"/>
+          <p:cNvSpPr/>
+          <p:nvPr/>
+        </p:nvSpPr>
+        <p:spPr>
+          <a:xfrm>
+            <a:off x="6900709" y="4216858"/>
+            <a:ext cx="1350236" cy="1350236"/>
+          </a:xfrm>
+          <a:prstGeom prst="diamond">
+            <a:avLst/>
+          </a:prstGeom>
+          <a:noFill/>
+          <a:ln w="28575">
+            <a:solidFill>
+              <a:schemeClr val="tx1"/>
+            </a:solidFill>
+          </a:ln>
+        </p:spPr>
+        <p:style>
+          <a:lnRef idx="2">
+            <a:schemeClr val="accent1">
+              <a:shade val="50000"/>
+            </a:schemeClr>
+          </a:lnRef>
+          <a:fillRef idx="1">
+            <a:schemeClr val="accent1"/>
+          </a:fillRef>
+          <a:effectRef idx="0">
+            <a:schemeClr val="accent1"/>
+          </a:effectRef>
+          <a:fontRef idx="minor">
+            <a:schemeClr val="lt1"/>
+          </a:fontRef>
+        </p:style>
+        <p:txBody>
+          <a:bodyPr rtlCol="0" anchor="ctr"/>
+          <a:lstStyle/>
+          <a:p>
+            <a:pPr algn="ctr"/>
+            <a:endParaRPr lang="en-NZ"/>
+          </a:p>
+        </p:txBody>
+      </p:sp>
+      <p:sp>
+        <p:nvSpPr>
+          <p:cNvPr id="71" name="Rectangle 70"/>
+          <p:cNvSpPr/>
+          <p:nvPr/>
+        </p:nvSpPr>
+        <p:spPr>
+          <a:xfrm>
+            <a:off x="6998239" y="4536784"/>
+            <a:ext cx="1217757" cy="646331"/>
+          </a:xfrm>
+          <a:prstGeom prst="rect">
+            <a:avLst/>
+          </a:prstGeom>
+        </p:spPr>
+        <p:txBody>
+          <a:bodyPr wrap="square">
+            <a:spAutoFit/>
+          </a:bodyPr>
+          <a:lstStyle/>
+          <a:p>
+            <a:pPr algn="ctr"/>
+            <a:r>
+              <a:rPr lang="en-NZ" dirty="0"/>
+              <a:t>temp &lt;</a:t>
+            </a:r>
+            <a:r>
+              <a:rPr lang="en-NZ" dirty="0" smtClean="0"/>
+              <a:t> </a:t>
+            </a:r>
+            <a:r>
+              <a:rPr lang="en-NZ" dirty="0" err="1" smtClean="0"/>
+              <a:t>SpeedMin</a:t>
+            </a:r>
+            <a:endParaRPr lang="en-NZ" dirty="0"/>
+          </a:p>
+        </p:txBody>
+      </p:sp>
+      <p:cxnSp>
+        <p:nvCxnSpPr>
+          <p:cNvPr id="73" name="Elbow Connector 72"/>
+          <p:cNvCxnSpPr>
+            <a:stCxn id="64" idx="3"/>
+            <a:endCxn id="68" idx="1"/>
+          </p:cNvCxnSpPr>
+          <p:nvPr/>
+        </p:nvCxnSpPr>
+        <p:spPr>
+          <a:xfrm>
+            <a:off x="6025019" y="2282434"/>
+            <a:ext cx="881808" cy="809607"/>
+          </a:xfrm>
+          <a:prstGeom prst="bentConnector3">
+            <a:avLst>
+              <a:gd name="adj1" fmla="val 50000"/>
+            </a:avLst>
+          </a:prstGeom>
+          <a:ln w="28575">
+            <a:solidFill>
+              <a:schemeClr val="tx1"/>
+            </a:solidFill>
+            <a:tailEnd type="triangle"/>
+          </a:ln>
+        </p:spPr>
+        <p:style>
+          <a:lnRef idx="1">
+            <a:schemeClr val="accent1"/>
+          </a:lnRef>
+          <a:fillRef idx="0">
+            <a:schemeClr val="accent1"/>
+          </a:fillRef>
+          <a:effectRef idx="0">
+            <a:schemeClr val="accent1"/>
+          </a:effectRef>
+          <a:fontRef idx="minor">
+            <a:schemeClr val="tx1"/>
+          </a:fontRef>
+        </p:style>
+      </p:cxnSp>
+      <p:cxnSp>
+        <p:nvCxnSpPr>
+          <p:cNvPr id="94" name="Elbow Connector 93"/>
+          <p:cNvCxnSpPr>
+            <a:stCxn id="30" idx="3"/>
+          </p:cNvCxnSpPr>
+          <p:nvPr/>
+        </p:nvCxnSpPr>
+        <p:spPr>
+          <a:xfrm flipV="1">
+            <a:off x="6024783" y="3092041"/>
+            <a:ext cx="441140" cy="950121"/>
+          </a:xfrm>
+          <a:prstGeom prst="bentConnector2">
+            <a:avLst/>
+          </a:prstGeom>
+          <a:ln w="28575">
+            <a:solidFill>
+              <a:schemeClr val="tx1"/>
+            </a:solidFill>
+            <a:tailEnd type="triangle"/>
+          </a:ln>
+        </p:spPr>
+        <p:style>
+          <a:lnRef idx="1">
+            <a:schemeClr val="accent1"/>
+          </a:lnRef>
+          <a:fillRef idx="0">
+            <a:schemeClr val="accent1"/>
+          </a:fillRef>
+          <a:effectRef idx="0">
+            <a:schemeClr val="accent1"/>
+          </a:effectRef>
+          <a:fontRef idx="minor">
+            <a:schemeClr val="tx1"/>
+          </a:fontRef>
+        </p:style>
+      </p:cxnSp>
+      <p:cxnSp>
+        <p:nvCxnSpPr>
+          <p:cNvPr id="98" name="Straight Arrow Connector 97"/>
+          <p:cNvCxnSpPr>
+            <a:stCxn id="68" idx="2"/>
+            <a:endCxn id="70" idx="0"/>
+          </p:cNvCxnSpPr>
+          <p:nvPr/>
+        </p:nvCxnSpPr>
+        <p:spPr>
+          <a:xfrm flipH="1">
+            <a:off x="7575827" y="3767159"/>
+            <a:ext cx="6118" cy="449699"/>
+          </a:xfrm>
+          <a:prstGeom prst="straightConnector1">
+            <a:avLst/>
+          </a:prstGeom>
+          <a:ln w="28575">
+            <a:solidFill>
+              <a:schemeClr val="tx1"/>
+            </a:solidFill>
+            <a:tailEnd type="triangle"/>
+          </a:ln>
+        </p:spPr>
+        <p:style>
+          <a:lnRef idx="1">
+            <a:schemeClr val="accent1"/>
+          </a:lnRef>
+          <a:fillRef idx="0">
+            <a:schemeClr val="accent1"/>
+          </a:fillRef>
+          <a:effectRef idx="0">
+            <a:schemeClr val="accent1"/>
+          </a:effectRef>
+          <a:fontRef idx="minor">
+            <a:schemeClr val="tx1"/>
+          </a:fontRef>
+        </p:style>
+      </p:cxnSp>
+      <p:cxnSp>
+        <p:nvCxnSpPr>
+          <p:cNvPr id="102" name="Elbow Connector 101"/>
+          <p:cNvCxnSpPr>
+            <a:stCxn id="31" idx="3"/>
+            <a:endCxn id="70" idx="0"/>
+          </p:cNvCxnSpPr>
+          <p:nvPr/>
+        </p:nvCxnSpPr>
+        <p:spPr>
+          <a:xfrm flipV="1">
+            <a:off x="6024783" y="4216858"/>
+            <a:ext cx="1551044" cy="1560101"/>
+          </a:xfrm>
+          <a:prstGeom prst="bentConnector4">
+            <a:avLst>
+              <a:gd name="adj1" fmla="val 28237"/>
+              <a:gd name="adj2" fmla="val 99390"/>
+            </a:avLst>
+          </a:prstGeom>
+          <a:ln w="28575">
+            <a:solidFill>
+              <a:schemeClr val="tx1"/>
+            </a:solidFill>
+            <a:tailEnd type="triangle"/>
+          </a:ln>
+        </p:spPr>
+        <p:style>
+          <a:lnRef idx="1">
+            <a:schemeClr val="accent1"/>
+          </a:lnRef>
+          <a:fillRef idx="0">
+            <a:schemeClr val="accent1"/>
+          </a:fillRef>
+          <a:effectRef idx="0">
+            <a:schemeClr val="accent1"/>
+          </a:effectRef>
+          <a:fontRef idx="minor">
+            <a:schemeClr val="tx1"/>
+          </a:fontRef>
+        </p:style>
+      </p:cxnSp>
+      <p:sp>
+        <p:nvSpPr>
+          <p:cNvPr id="109" name="Parallelogram 108"/>
+          <p:cNvSpPr/>
+          <p:nvPr/>
+        </p:nvSpPr>
+        <p:spPr>
+          <a:xfrm>
+            <a:off x="8717017" y="2661290"/>
+            <a:ext cx="1752600" cy="861501"/>
+          </a:xfrm>
+          <a:prstGeom prst="parallelogram">
+            <a:avLst/>
+          </a:prstGeom>
+          <a:noFill/>
+          <a:ln w="28575">
+            <a:solidFill>
+              <a:schemeClr val="tx1"/>
+            </a:solidFill>
+          </a:ln>
+        </p:spPr>
+        <p:style>
+          <a:lnRef idx="2">
+            <a:schemeClr val="accent1">
+              <a:shade val="50000"/>
+            </a:schemeClr>
+          </a:lnRef>
+          <a:fillRef idx="1">
+            <a:schemeClr val="accent1"/>
+          </a:fillRef>
+          <a:effectRef idx="0">
+            <a:schemeClr val="accent1"/>
+          </a:effectRef>
+          <a:fontRef idx="minor">
+            <a:schemeClr val="lt1"/>
+          </a:fontRef>
+        </p:style>
+        <p:txBody>
+          <a:bodyPr rtlCol="0" anchor="ctr"/>
+          <a:lstStyle/>
+          <a:p>
+            <a:pPr algn="ctr"/>
+            <a:endParaRPr lang="en-NZ"/>
+          </a:p>
+        </p:txBody>
+      </p:sp>
+      <p:sp>
+        <p:nvSpPr>
+          <p:cNvPr id="110" name="Parallelogram 109"/>
+          <p:cNvSpPr/>
+          <p:nvPr/>
+        </p:nvSpPr>
+        <p:spPr>
+          <a:xfrm>
+            <a:off x="8717017" y="4429198"/>
+            <a:ext cx="1752600" cy="861501"/>
+          </a:xfrm>
+          <a:prstGeom prst="parallelogram">
+            <a:avLst/>
+          </a:prstGeom>
+          <a:noFill/>
+          <a:ln w="28575">
+            <a:solidFill>
+              <a:schemeClr val="tx1"/>
+            </a:solidFill>
+          </a:ln>
+        </p:spPr>
+        <p:style>
+          <a:lnRef idx="2">
+            <a:schemeClr val="accent1">
+              <a:shade val="50000"/>
+            </a:schemeClr>
+          </a:lnRef>
+          <a:fillRef idx="1">
+            <a:schemeClr val="accent1"/>
+          </a:fillRef>
+          <a:effectRef idx="0">
+            <a:schemeClr val="accent1"/>
+          </a:effectRef>
+          <a:fontRef idx="minor">
+            <a:schemeClr val="lt1"/>
+          </a:fontRef>
+        </p:style>
+        <p:txBody>
+          <a:bodyPr rtlCol="0" anchor="ctr"/>
+          <a:lstStyle/>
+          <a:p>
+            <a:pPr algn="ctr"/>
+            <a:endParaRPr lang="en-NZ"/>
+          </a:p>
+        </p:txBody>
+      </p:sp>
+      <p:sp>
+        <p:nvSpPr>
+          <p:cNvPr id="111" name="Parallelogram 110"/>
+          <p:cNvSpPr/>
+          <p:nvPr/>
+        </p:nvSpPr>
+        <p:spPr>
+          <a:xfrm>
+            <a:off x="8717017" y="5766355"/>
+            <a:ext cx="1752600" cy="861501"/>
+          </a:xfrm>
+          <a:prstGeom prst="parallelogram">
+            <a:avLst/>
+          </a:prstGeom>
+          <a:noFill/>
+          <a:ln w="28575">
+            <a:solidFill>
+              <a:schemeClr val="tx1"/>
+            </a:solidFill>
+          </a:ln>
+        </p:spPr>
+        <p:style>
+          <a:lnRef idx="2">
+            <a:schemeClr val="accent1">
+              <a:shade val="50000"/>
+            </a:schemeClr>
+          </a:lnRef>
+          <a:fillRef idx="1">
+            <a:schemeClr val="accent1"/>
+          </a:fillRef>
+          <a:effectRef idx="0">
+            <a:schemeClr val="accent1"/>
+          </a:effectRef>
+          <a:fontRef idx="minor">
+            <a:schemeClr val="lt1"/>
+          </a:fontRef>
+        </p:style>
+        <p:txBody>
+          <a:bodyPr rtlCol="0" anchor="ctr"/>
+          <a:lstStyle/>
+          <a:p>
+            <a:pPr algn="ctr"/>
+            <a:endParaRPr lang="en-NZ"/>
+          </a:p>
+        </p:txBody>
+      </p:sp>
+      <p:cxnSp>
+        <p:nvCxnSpPr>
+          <p:cNvPr id="112" name="Straight Arrow Connector 111"/>
+          <p:cNvCxnSpPr/>
+          <p:nvPr/>
+        </p:nvCxnSpPr>
+        <p:spPr>
+          <a:xfrm>
+            <a:off x="8250945" y="3092040"/>
+            <a:ext cx="581115" cy="0"/>
+          </a:xfrm>
+          <a:prstGeom prst="straightConnector1">
+            <a:avLst/>
+          </a:prstGeom>
+          <a:ln w="28575">
+            <a:solidFill>
+              <a:schemeClr val="tx1"/>
+            </a:solidFill>
+            <a:tailEnd type="triangle"/>
+          </a:ln>
+        </p:spPr>
+        <p:style>
+          <a:lnRef idx="1">
+            <a:schemeClr val="accent1"/>
+          </a:lnRef>
+          <a:fillRef idx="0">
+            <a:schemeClr val="accent1"/>
+          </a:fillRef>
+          <a:effectRef idx="0">
+            <a:schemeClr val="accent1"/>
+          </a:effectRef>
+          <a:fontRef idx="minor">
+            <a:schemeClr val="tx1"/>
+          </a:fontRef>
+        </p:style>
+      </p:cxnSp>
+      <p:cxnSp>
+        <p:nvCxnSpPr>
+          <p:cNvPr id="113" name="Straight Arrow Connector 112"/>
+          <p:cNvCxnSpPr/>
+          <p:nvPr/>
+        </p:nvCxnSpPr>
+        <p:spPr>
+          <a:xfrm>
+            <a:off x="8250945" y="4884938"/>
+            <a:ext cx="581115" cy="0"/>
+          </a:xfrm>
+          <a:prstGeom prst="straightConnector1">
+            <a:avLst/>
+          </a:prstGeom>
+          <a:ln w="28575">
+            <a:solidFill>
+              <a:schemeClr val="tx1"/>
+            </a:solidFill>
+            <a:tailEnd type="triangle"/>
+          </a:ln>
+        </p:spPr>
+        <p:style>
+          <a:lnRef idx="1">
+            <a:schemeClr val="accent1"/>
+          </a:lnRef>
+          <a:fillRef idx="0">
+            <a:schemeClr val="accent1"/>
+          </a:fillRef>
+          <a:effectRef idx="0">
+            <a:schemeClr val="accent1"/>
+          </a:effectRef>
+          <a:fontRef idx="minor">
+            <a:schemeClr val="tx1"/>
+          </a:fontRef>
+        </p:style>
+      </p:cxnSp>
+      <p:cxnSp>
+        <p:nvCxnSpPr>
+          <p:cNvPr id="115" name="Elbow Connector 114"/>
+          <p:cNvCxnSpPr>
+            <a:stCxn id="70" idx="2"/>
+            <a:endCxn id="111" idx="5"/>
+          </p:cNvCxnSpPr>
+          <p:nvPr/>
+        </p:nvCxnSpPr>
+        <p:spPr>
+          <a:xfrm rot="16200000" flipH="1">
+            <a:off x="7885260" y="5257661"/>
+            <a:ext cx="630012" cy="1248878"/>
+          </a:xfrm>
+          <a:prstGeom prst="bentConnector2">
+            <a:avLst/>
+          </a:prstGeom>
+          <a:ln w="28575">
+            <a:solidFill>
+              <a:schemeClr val="tx1"/>
+            </a:solidFill>
+            <a:tailEnd type="triangle"/>
+          </a:ln>
+        </p:spPr>
+        <p:style>
+          <a:lnRef idx="1">
+            <a:schemeClr val="accent1"/>
+          </a:lnRef>
+          <a:fillRef idx="0">
+            <a:schemeClr val="accent1"/>
+          </a:fillRef>
+          <a:effectRef idx="0">
+            <a:schemeClr val="accent1"/>
+          </a:effectRef>
+          <a:fontRef idx="minor">
+            <a:schemeClr val="tx1"/>
+          </a:fontRef>
+        </p:style>
+      </p:cxnSp>
+      <p:cxnSp>
+        <p:nvCxnSpPr>
+          <p:cNvPr id="117" name="Elbow Connector 116"/>
+          <p:cNvCxnSpPr>
+            <a:stCxn id="109" idx="2"/>
+          </p:cNvCxnSpPr>
+          <p:nvPr/>
+        </p:nvCxnSpPr>
+        <p:spPr>
+          <a:xfrm flipH="1" flipV="1">
+            <a:off x="3282940" y="1501081"/>
+            <a:ext cx="7078989" cy="1590960"/>
+          </a:xfrm>
+          <a:prstGeom prst="bentConnector3">
+            <a:avLst>
+              <a:gd name="adj1" fmla="val -4751"/>
+            </a:avLst>
+          </a:prstGeom>
+          <a:ln w="28575">
+            <a:solidFill>
+              <a:schemeClr val="tx1"/>
+            </a:solidFill>
+            <a:tailEnd type="triangle"/>
+          </a:ln>
+        </p:spPr>
+        <p:style>
+          <a:lnRef idx="1">
+            <a:schemeClr val="accent1"/>
+          </a:lnRef>
+          <a:fillRef idx="0">
+            <a:schemeClr val="accent1"/>
+          </a:fillRef>
+          <a:effectRef idx="0">
+            <a:schemeClr val="accent1"/>
+          </a:effectRef>
+          <a:fontRef idx="minor">
+            <a:schemeClr val="tx1"/>
+          </a:fontRef>
+        </p:style>
+      </p:cxnSp>
+      <p:cxnSp>
+        <p:nvCxnSpPr>
+          <p:cNvPr id="119" name="Elbow Connector 118"/>
+          <p:cNvCxnSpPr>
+            <a:stCxn id="110" idx="2"/>
+          </p:cNvCxnSpPr>
+          <p:nvPr/>
+        </p:nvCxnSpPr>
+        <p:spPr>
+          <a:xfrm flipV="1">
+            <a:off x="10361929" y="3092040"/>
+            <a:ext cx="334646" cy="1767909"/>
+          </a:xfrm>
+          <a:prstGeom prst="bentConnector2">
+            <a:avLst/>
+          </a:prstGeom>
+          <a:ln w="28575">
+            <a:solidFill>
+              <a:schemeClr val="tx1"/>
+            </a:solidFill>
+            <a:tailEnd type="triangle"/>
+          </a:ln>
+        </p:spPr>
+        <p:style>
+          <a:lnRef idx="1">
+            <a:schemeClr val="accent1"/>
+          </a:lnRef>
+          <a:fillRef idx="0">
+            <a:schemeClr val="accent1"/>
+          </a:fillRef>
+          <a:effectRef idx="0">
+            <a:schemeClr val="accent1"/>
+          </a:effectRef>
+          <a:fontRef idx="minor">
+            <a:schemeClr val="tx1"/>
+          </a:fontRef>
+        </p:style>
+      </p:cxnSp>
+      <p:cxnSp>
+        <p:nvCxnSpPr>
+          <p:cNvPr id="121" name="Elbow Connector 120"/>
+          <p:cNvCxnSpPr>
+            <a:stCxn id="111" idx="2"/>
+          </p:cNvCxnSpPr>
+          <p:nvPr/>
+        </p:nvCxnSpPr>
+        <p:spPr>
+          <a:xfrm flipV="1">
+            <a:off x="10361929" y="4884938"/>
+            <a:ext cx="334646" cy="1312168"/>
+          </a:xfrm>
+          <a:prstGeom prst="bentConnector2">
+            <a:avLst/>
+          </a:prstGeom>
+          <a:ln w="28575">
+            <a:solidFill>
+              <a:schemeClr val="tx1"/>
+            </a:solidFill>
+            <a:tailEnd type="triangle"/>
+          </a:ln>
+        </p:spPr>
+        <p:style>
+          <a:lnRef idx="1">
+            <a:schemeClr val="accent1"/>
+          </a:lnRef>
+          <a:fillRef idx="0">
+            <a:schemeClr val="accent1"/>
+          </a:fillRef>
+          <a:effectRef idx="0">
+            <a:schemeClr val="accent1"/>
+          </a:effectRef>
+          <a:fontRef idx="minor">
+            <a:schemeClr val="tx1"/>
+          </a:fontRef>
+        </p:style>
+      </p:cxnSp>
+      <p:sp>
+        <p:nvSpPr>
+          <p:cNvPr id="122" name="Rectangle 121"/>
+          <p:cNvSpPr/>
+          <p:nvPr/>
+        </p:nvSpPr>
+        <p:spPr>
+          <a:xfrm>
+            <a:off x="8892182" y="2746721"/>
+            <a:ext cx="1396939" cy="646331"/>
+          </a:xfrm>
+          <a:prstGeom prst="rect">
+            <a:avLst/>
+          </a:prstGeom>
+        </p:spPr>
+        <p:txBody>
+          <a:bodyPr wrap="square">
+            <a:spAutoFit/>
+          </a:bodyPr>
+          <a:lstStyle/>
+          <a:p>
+            <a:pPr algn="ctr"/>
+            <a:r>
+              <a:rPr lang="en-NZ" dirty="0" err="1" smtClean="0"/>
+              <a:t>CruiseSpeed</a:t>
+            </a:r>
+            <a:r>
+              <a:rPr lang="en-NZ" dirty="0" smtClean="0"/>
+              <a:t> = </a:t>
+            </a:r>
+            <a:r>
+              <a:rPr lang="en-NZ" dirty="0" err="1" smtClean="0"/>
+              <a:t>SpeedMax</a:t>
+            </a:r>
+            <a:endParaRPr lang="en-NZ" dirty="0"/>
+          </a:p>
+        </p:txBody>
+      </p:sp>
+      <p:sp>
+        <p:nvSpPr>
+          <p:cNvPr id="123" name="Rectangle 122"/>
+          <p:cNvSpPr/>
+          <p:nvPr/>
+        </p:nvSpPr>
+        <p:spPr>
+          <a:xfrm>
+            <a:off x="8904868" y="4536784"/>
+            <a:ext cx="1396939" cy="646331"/>
+          </a:xfrm>
+          <a:prstGeom prst="rect">
+            <a:avLst/>
+          </a:prstGeom>
+        </p:spPr>
+        <p:txBody>
+          <a:bodyPr wrap="square">
+            <a:spAutoFit/>
+          </a:bodyPr>
+          <a:lstStyle/>
+          <a:p>
+            <a:pPr algn="ctr"/>
+            <a:r>
+              <a:rPr lang="en-NZ" dirty="0" err="1" smtClean="0"/>
+              <a:t>CruiseSpeed</a:t>
+            </a:r>
+            <a:r>
+              <a:rPr lang="en-NZ" dirty="0" smtClean="0"/>
+              <a:t> = </a:t>
+            </a:r>
+            <a:r>
+              <a:rPr lang="en-NZ" dirty="0" err="1" smtClean="0"/>
+              <a:t>SpeedMin</a:t>
+            </a:r>
+            <a:endParaRPr lang="en-NZ" dirty="0"/>
+          </a:p>
+        </p:txBody>
+      </p:sp>
+      <p:sp>
+        <p:nvSpPr>
+          <p:cNvPr id="124" name="Rectangle 123"/>
+          <p:cNvSpPr/>
+          <p:nvPr/>
+        </p:nvSpPr>
+        <p:spPr>
+          <a:xfrm>
+            <a:off x="8904867" y="5882099"/>
+            <a:ext cx="1396939" cy="646331"/>
+          </a:xfrm>
+          <a:prstGeom prst="rect">
+            <a:avLst/>
+          </a:prstGeom>
+        </p:spPr>
+        <p:txBody>
+          <a:bodyPr wrap="square">
+            <a:spAutoFit/>
+          </a:bodyPr>
+          <a:lstStyle/>
+          <a:p>
+            <a:pPr algn="ctr"/>
+            <a:r>
+              <a:rPr lang="en-NZ" dirty="0" err="1" smtClean="0"/>
+              <a:t>CruiseSpeed</a:t>
+            </a:r>
+            <a:r>
+              <a:rPr lang="en-NZ" dirty="0" smtClean="0"/>
+              <a:t> = temp</a:t>
+            </a:r>
+            <a:endParaRPr lang="en-NZ" dirty="0"/>
+          </a:p>
+        </p:txBody>
+      </p:sp>
+      <p:sp>
+        <p:nvSpPr>
+          <p:cNvPr id="126" name="TextBox 125"/>
+          <p:cNvSpPr txBox="1"/>
+          <p:nvPr/>
+        </p:nvSpPr>
+        <p:spPr>
+          <a:xfrm>
+            <a:off x="8329871" y="2770325"/>
+            <a:ext cx="301686" cy="369332"/>
+          </a:xfrm>
+          <a:prstGeom prst="rect">
+            <a:avLst/>
+          </a:prstGeom>
+          <a:noFill/>
+        </p:spPr>
+        <p:txBody>
+          <a:bodyPr wrap="none" rtlCol="0">
+            <a:spAutoFit/>
+          </a:bodyPr>
+          <a:lstStyle/>
+          <a:p>
+            <a:pPr algn="ctr"/>
+            <a:r>
+              <a:rPr lang="en-NZ" dirty="0" smtClean="0"/>
+              <a:t>1</a:t>
+            </a:r>
+            <a:endParaRPr lang="en-NZ" dirty="0"/>
+          </a:p>
+        </p:txBody>
+      </p:sp>
+      <p:sp>
+        <p:nvSpPr>
+          <p:cNvPr id="127" name="TextBox 126"/>
+          <p:cNvSpPr txBox="1"/>
+          <p:nvPr/>
+        </p:nvSpPr>
+        <p:spPr>
+          <a:xfrm>
+            <a:off x="8354112" y="4556096"/>
+            <a:ext cx="301686" cy="369332"/>
+          </a:xfrm>
+          <a:prstGeom prst="rect">
+            <a:avLst/>
+          </a:prstGeom>
+          <a:noFill/>
+        </p:spPr>
+        <p:txBody>
+          <a:bodyPr wrap="none" rtlCol="0">
+            <a:spAutoFit/>
+          </a:bodyPr>
+          <a:lstStyle/>
+          <a:p>
+            <a:pPr algn="ctr"/>
+            <a:r>
+              <a:rPr lang="en-NZ" dirty="0" smtClean="0"/>
+              <a:t>1</a:t>
+            </a:r>
+            <a:endParaRPr lang="en-NZ" dirty="0"/>
+          </a:p>
+        </p:txBody>
+      </p:sp>
+      <p:sp>
+        <p:nvSpPr>
+          <p:cNvPr id="128" name="TextBox 127"/>
+          <p:cNvSpPr txBox="1"/>
+          <p:nvPr/>
+        </p:nvSpPr>
+        <p:spPr>
+          <a:xfrm>
+            <a:off x="7553525" y="3792566"/>
+            <a:ext cx="301686" cy="369332"/>
+          </a:xfrm>
+          <a:prstGeom prst="rect">
+            <a:avLst/>
+          </a:prstGeom>
+          <a:noFill/>
+        </p:spPr>
+        <p:txBody>
+          <a:bodyPr wrap="none" rtlCol="0">
+            <a:spAutoFit/>
+          </a:bodyPr>
+          <a:lstStyle/>
+          <a:p>
+            <a:pPr algn="ctr"/>
+            <a:r>
+              <a:rPr lang="en-NZ" dirty="0"/>
+              <a:t>0</a:t>
+            </a:r>
+          </a:p>
+        </p:txBody>
+      </p:sp>
+      <p:sp>
+        <p:nvSpPr>
+          <p:cNvPr id="129" name="TextBox 128"/>
+          <p:cNvSpPr txBox="1"/>
+          <p:nvPr/>
+        </p:nvSpPr>
+        <p:spPr>
+          <a:xfrm>
+            <a:off x="7546336" y="5574417"/>
+            <a:ext cx="301686" cy="369332"/>
+          </a:xfrm>
+          <a:prstGeom prst="rect">
+            <a:avLst/>
+          </a:prstGeom>
+          <a:noFill/>
+        </p:spPr>
+        <p:txBody>
+          <a:bodyPr wrap="none" rtlCol="0">
+            <a:spAutoFit/>
+          </a:bodyPr>
+          <a:lstStyle/>
+          <a:p>
+            <a:pPr algn="ctr"/>
+            <a:r>
+              <a:rPr lang="en-NZ" dirty="0"/>
+              <a:t>0</a:t>
+            </a:r>
+          </a:p>
+        </p:txBody>
+      </p:sp>
+    </p:spTree>
+    <p:extLst>
+      <p:ext uri="{BB962C8B-B14F-4D97-AF65-F5344CB8AC3E}">
+        <p14:creationId xmlns:p14="http://schemas.microsoft.com/office/powerpoint/2010/main" xmlns="" val="3416959525"/>
+      </p:ext>
+    </p:extLst>
   </p:cSld>
   <p:clrMapOvr>
     <a:masterClrMapping/>
@@ -7959,7 +9948,7 @@
   <a:extraClrSchemeLst/>
   <a:extLst>
     <a:ext uri="{05A4C25C-085E-4340-85A3-A5531E510DB2}">
-      <thm15:themeFamily xmlns="" xmlns:thm15="http://schemas.microsoft.com/office/thememl/2012/main" name="Office Theme" id="{62F939B6-93AF-4DB8-9C6B-D6C7DFDC589F}" vid="{4A3C46E8-61CC-4603-A589-7422A47A8E4A}"/>
+      <thm15:themeFamily xmlns:thm15="http://schemas.microsoft.com/office/thememl/2012/main" xmlns="" name="Office Theme" id="{62F939B6-93AF-4DB8-9C6B-D6C7DFDC589F}" vid="{4A3C46E8-61CC-4603-A589-7422A47A8E4A}"/>
     </a:ext>
   </a:extLst>
 </a:theme>

</xml_diff>